<commit_message>
Minor tweaks to narrative
Tightening up speaker notes
</commit_message>
<xml_diff>
--- a/POETS - Code Palousa 2015.pptx
+++ b/POETS - Code Palousa 2015.pptx
@@ -303,7 +303,7 @@
           <a:p>
             <a:fld id="{C54A4886-B4AF-42F7-97BE-95CDF82A73E3}" type="datetimeFigureOut">
               <a:rPr lang="en-US" smtClean="0"/>
-              <a:t>4/28/2015</a:t>
+              <a:t>4/29/2015</a:t>
             </a:fld>
             <a:endParaRPr lang="en-US"/>
           </a:p>
@@ -819,19 +819,7 @@
             </a:pPr>
             <a:r>
               <a:rPr lang="en-US" baseline="0" dirty="0" smtClean="0"/>
-              <a:t>Not </a:t>
-            </a:r>
-            <a:r>
-              <a:rPr lang="en-US" baseline="0" dirty="0" smtClean="0"/>
-              <a:t>an isolated case – </a:t>
-            </a:r>
-            <a:r>
-              <a:rPr lang="en-US" baseline="0" dirty="0" smtClean="0"/>
-              <a:t>we had lots of tests like this, and I’m guessing that many of you do to</a:t>
-            </a:r>
-            <a:r>
-              <a:rPr lang="en-US" baseline="0" dirty="0" smtClean="0"/>
-              <a:t/>
+              <a:t>Not an isolated case – we had lots of tests like this, and I’m guessing that many of you do to</a:t>
             </a:r>
             <a:br>
               <a:rPr lang="en-US" baseline="0" dirty="0" smtClean="0"/>
@@ -841,11 +829,7 @@
           <a:p>
             <a:r>
               <a:rPr lang="en-US" b="1" i="0" baseline="0" dirty="0" smtClean="0"/>
-              <a:t>TRANSITION</a:t>
-            </a:r>
-            <a:r>
-              <a:rPr lang="en-US" b="1" i="0" baseline="0" dirty="0" smtClean="0"/>
-              <a:t>: </a:t>
+              <a:t>TRANSITION: </a:t>
             </a:r>
             <a:r>
               <a:rPr lang="en-US" b="0" i="0" baseline="0" dirty="0" smtClean="0"/>
@@ -884,19 +868,7 @@
                 <a:ea typeface="+mn-ea"/>
                 <a:cs typeface="+mn-cs"/>
               </a:rPr>
-              <a:t>The things I’m going to show you today are the </a:t>
-            </a:r>
-            <a:r>
-              <a:rPr lang="en-US" sz="1200" kern="1200" dirty="0" smtClean="0">
-                <a:solidFill>
-                  <a:schemeClr val="tx1"/>
-                </a:solidFill>
-                <a:effectLst/>
-                <a:latin typeface="+mn-lt"/>
-                <a:ea typeface="+mn-ea"/>
-                <a:cs typeface="+mn-cs"/>
-              </a:rPr>
-              <a:t>techniques that we developed</a:t>
+              <a:t>The things I’m going to show you today are the techniques that we developed</a:t>
             </a:r>
             <a:r>
               <a:rPr lang="en-US" sz="1200" kern="1200" baseline="0" dirty="0" smtClean="0">
@@ -922,15 +894,6 @@
               </a:rPr>
               <a:t> </a:t>
             </a:r>
-            <a:endParaRPr lang="en-US" sz="1200" kern="1200" dirty="0" smtClean="0">
-              <a:solidFill>
-                <a:schemeClr val="tx1"/>
-              </a:solidFill>
-              <a:effectLst/>
-              <a:latin typeface="+mn-lt"/>
-              <a:ea typeface="+mn-ea"/>
-              <a:cs typeface="+mn-cs"/>
-            </a:endParaRPr>
           </a:p>
           <a:p>
             <a:endParaRPr lang="en-US" b="1" i="0" baseline="0" dirty="0" smtClean="0"/>
@@ -2551,19 +2514,7 @@
                 <a:ea typeface="+mn-ea"/>
                 <a:cs typeface="+mn-cs"/>
               </a:rPr>
-              <a:t>Those are my </a:t>
-            </a:r>
-            <a:r>
-              <a:rPr lang="en-US" sz="1200" kern="1200" dirty="0" smtClean="0">
-                <a:solidFill>
-                  <a:schemeClr val="tx1"/>
-                </a:solidFill>
-                <a:effectLst/>
-                <a:latin typeface="+mn-lt"/>
-                <a:ea typeface="+mn-ea"/>
-                <a:cs typeface="+mn-cs"/>
-              </a:rPr>
-              <a:t>assertions,</a:t>
+              <a:t>Those are my assertions,</a:t>
             </a:r>
             <a:r>
               <a:rPr lang="en-US" sz="1200" kern="1200" baseline="0" dirty="0" smtClean="0">
@@ -2575,67 +2526,7 @@
                 <a:ea typeface="+mn-ea"/>
                 <a:cs typeface="+mn-cs"/>
               </a:rPr>
-              <a:t> based </a:t>
-            </a:r>
-            <a:r>
-              <a:rPr lang="en-US" sz="1200" kern="1200" baseline="0" dirty="0" smtClean="0">
-                <a:solidFill>
-                  <a:schemeClr val="tx1"/>
-                </a:solidFill>
-                <a:effectLst/>
-                <a:latin typeface="+mn-lt"/>
-                <a:ea typeface="+mn-ea"/>
-                <a:cs typeface="+mn-cs"/>
-              </a:rPr>
-              <a:t>on years of </a:t>
-            </a:r>
-            <a:r>
-              <a:rPr lang="en-US" sz="1200" kern="1200" baseline="0" dirty="0" smtClean="0">
-                <a:solidFill>
-                  <a:schemeClr val="tx1"/>
-                </a:solidFill>
-                <a:effectLst/>
-                <a:latin typeface="+mn-lt"/>
-                <a:ea typeface="+mn-ea"/>
-                <a:cs typeface="+mn-cs"/>
-              </a:rPr>
-              <a:t>experience </a:t>
-            </a:r>
-            <a:r>
-              <a:rPr lang="en-US" sz="1200" kern="1200" baseline="0" dirty="0" smtClean="0">
-                <a:solidFill>
-                  <a:schemeClr val="tx1"/>
-                </a:solidFill>
-                <a:effectLst/>
-                <a:latin typeface="+mn-lt"/>
-                <a:ea typeface="+mn-ea"/>
-                <a:cs typeface="+mn-cs"/>
-              </a:rPr>
-              <a:t>writing tests </a:t>
-            </a:r>
-            <a:r>
-              <a:rPr lang="en-US" sz="1200" kern="1200" baseline="0" dirty="0" smtClean="0">
-                <a:solidFill>
-                  <a:schemeClr val="tx1"/>
-                </a:solidFill>
-                <a:effectLst/>
-                <a:latin typeface="+mn-lt"/>
-                <a:ea typeface="+mn-ea"/>
-                <a:cs typeface="+mn-cs"/>
-              </a:rPr>
-              <a:t>in the trenches just </a:t>
-            </a:r>
-            <a:r>
-              <a:rPr lang="en-US" sz="1200" kern="1200" baseline="0" dirty="0" smtClean="0">
-                <a:solidFill>
-                  <a:schemeClr val="tx1"/>
-                </a:solidFill>
-                <a:effectLst/>
-                <a:latin typeface="+mn-lt"/>
-                <a:ea typeface="+mn-ea"/>
-                <a:cs typeface="+mn-cs"/>
-              </a:rPr>
-              <a:t>like you. </a:t>
+              <a:t> based on years of experience writing tests in the trenches just like you. </a:t>
             </a:r>
           </a:p>
           <a:p>
@@ -2671,31 +2562,7 @@
                 <a:ea typeface="+mn-ea"/>
                 <a:cs typeface="+mn-cs"/>
               </a:rPr>
-              <a:t>I have </a:t>
-            </a:r>
-            <a:r>
-              <a:rPr lang="en-US" sz="1200" kern="1200" baseline="0" dirty="0" smtClean="0">
-                <a:solidFill>
-                  <a:schemeClr val="tx1"/>
-                </a:solidFill>
-                <a:effectLst/>
-                <a:latin typeface="+mn-lt"/>
-                <a:ea typeface="+mn-ea"/>
-                <a:cs typeface="+mn-cs"/>
-              </a:rPr>
-              <a:t>overwhelmed by confusion </a:t>
-            </a:r>
-            <a:r>
-              <a:rPr lang="en-US" sz="1200" kern="1200" baseline="0" dirty="0" smtClean="0">
-                <a:solidFill>
-                  <a:schemeClr val="tx1"/>
-                </a:solidFill>
-                <a:effectLst/>
-                <a:latin typeface="+mn-lt"/>
-                <a:ea typeface="+mn-ea"/>
-                <a:cs typeface="+mn-cs"/>
-              </a:rPr>
-              <a:t>while trying to understand a test with three screens of setup logic. </a:t>
+              <a:t>I have overwhelmed by confusion while trying to understand a test with three screens of setup logic. </a:t>
             </a:r>
           </a:p>
           <a:p>
@@ -3145,25 +3012,24 @@
               <a:rPr lang="en-US" baseline="0" dirty="0" err="1" smtClean="0"/>
               <a:t>etc</a:t>
             </a:r>
+            <a:endParaRPr lang="en-US" baseline="0" dirty="0" smtClean="0"/>
+          </a:p>
+          <a:p>
+            <a:pPr marL="628650" lvl="1" indent="-171450">
+              <a:buFont typeface="Arial" panose="020B0604020202020204" pitchFamily="34" charset="0"/>
+              <a:buChar char="•"/>
+            </a:pPr>
             <a:r>
               <a:rPr lang="en-US" baseline="0" dirty="0" smtClean="0"/>
-              <a:t/>
-            </a:r>
-            <a:br>
-              <a:rPr lang="en-US" baseline="0" dirty="0" smtClean="0"/>
-            </a:br>
+              <a:t>Being forced to write unnecessary code like this can make it very difficult to set up tests for complex systems</a:t>
+            </a:r>
+          </a:p>
+          <a:p>
+            <a:pPr marL="628650" lvl="1" indent="-171450">
+              <a:buFont typeface="Arial" panose="020B0604020202020204" pitchFamily="34" charset="0"/>
+              <a:buChar char="•"/>
+            </a:pPr>
             <a:endParaRPr lang="en-US" baseline="0" dirty="0" smtClean="0"/>
-          </a:p>
-          <a:p>
-            <a:pPr marL="171450" lvl="0" indent="-171450">
-              <a:buFont typeface="Arial" panose="020B0604020202020204" pitchFamily="34" charset="0"/>
-              <a:buChar char="•"/>
-            </a:pPr>
-            <a:r>
-              <a:rPr lang="en-US" baseline="0" dirty="0" smtClean="0"/>
-              <a:t>Irrelevant dependencies and noise values are a huge problem in large systems like this</a:t>
-            </a:r>
-            <a:endParaRPr lang="en-US" i="0" baseline="0" dirty="0" smtClean="0"/>
           </a:p>
           <a:p>
             <a:endParaRPr lang="en-US" i="0" baseline="0" dirty="0" smtClean="0"/>
@@ -3214,12 +3080,6 @@
               <a:defRPr/>
             </a:pPr>
             <a:endParaRPr lang="en-US" b="0" i="0" baseline="0" dirty="0" smtClean="0"/>
-          </a:p>
-          <a:p>
-            <a:r>
-              <a:rPr lang="en-US" baseline="0" dirty="0" smtClean="0"/>
-              <a:t>TODO: red/green colorblind issue</a:t>
-            </a:r>
           </a:p>
         </p:txBody>
       </p:sp>
@@ -3913,7 +3773,6 @@
               <a:rPr lang="en-US" b="0" i="0" baseline="0" dirty="0" smtClean="0"/>
               <a:t>Dictionary defines “expressive” as “effectively conveying thought or meaning”. </a:t>
             </a:r>
-            <a:endParaRPr lang="en-US" b="0" i="0" baseline="0" dirty="0" smtClean="0"/>
           </a:p>
           <a:p>
             <a:pPr marL="171450" indent="-171450">
@@ -3931,7 +3790,6 @@
               <a:rPr lang="en-US" b="0" i="0" baseline="0" dirty="0" smtClean="0"/>
               <a:t>Means that other developers should be able to read and understand our setup code with as minimal effort as possible</a:t>
             </a:r>
-            <a:endParaRPr lang="en-US" b="0" i="0" baseline="0" dirty="0" smtClean="0"/>
           </a:p>
           <a:p>
             <a:pPr marL="171450" indent="-171450">
@@ -3952,10 +3810,6 @@
             <a:r>
               <a:rPr lang="en-US" b="0" i="0" baseline="0" dirty="0" smtClean="0"/>
               <a:t>This is a really important idea so we’re going to dig in and look at a bunch of ways to write expressive code.</a:t>
-            </a:r>
-            <a:r>
-              <a:rPr lang="en-US" b="0" i="0" baseline="0" dirty="0" smtClean="0"/>
-              <a:t/>
             </a:r>
             <a:br>
               <a:rPr lang="en-US" b="0" i="0" baseline="0" dirty="0" smtClean="0"/>
@@ -4056,18 +3910,32 @@
             <a:endParaRPr lang="en-US" b="0" i="0" baseline="0" dirty="0" smtClean="0"/>
           </a:p>
           <a:p>
+            <a:pPr marL="171450" indent="-171450">
+              <a:buFont typeface="Arial" panose="020B0604020202020204" pitchFamily="34" charset="0"/>
+              <a:buChar char="•"/>
+            </a:pPr>
             <a:r>
               <a:rPr lang="en-US" b="0" i="0" baseline="0" dirty="0" smtClean="0"/>
-              <a:t>This means that all unnecessary code has been removed and everything that’s left has been crafted to be as easy to read and scan as possible.</a:t>
-            </a:r>
-          </a:p>
-          <a:p>
+              <a:t>All </a:t>
+            </a:r>
+            <a:r>
+              <a:rPr lang="en-US" b="0" i="0" baseline="0" dirty="0" smtClean="0"/>
+              <a:t>unnecessary code </a:t>
+            </a:r>
             <a:endParaRPr lang="en-US" b="0" i="0" baseline="0" dirty="0" smtClean="0"/>
           </a:p>
           <a:p>
+            <a:pPr marL="171450" indent="-171450">
+              <a:buFont typeface="Arial" panose="020B0604020202020204" pitchFamily="34" charset="0"/>
+              <a:buChar char="•"/>
+            </a:pPr>
             <a:r>
               <a:rPr lang="en-US" b="0" i="0" baseline="0" dirty="0" smtClean="0"/>
-              <a:t>We can’t understand the assertions that our tests make unless we understand the context too.</a:t>
+              <a:t>What’s left is as easy read </a:t>
+            </a:r>
+            <a:r>
+              <a:rPr lang="en-US" b="0" i="0" baseline="0" dirty="0" smtClean="0"/>
+              <a:t>and scan as possible.</a:t>
             </a:r>
           </a:p>
           <a:p>
@@ -4076,11 +3944,51 @@
           <a:p>
             <a:r>
               <a:rPr lang="en-US" b="0" i="0" baseline="0" dirty="0" smtClean="0"/>
-              <a:t>We have thousands of tests and read them every day; we should work our butts off to make them as easy to read as possible.</a:t>
-            </a:r>
-          </a:p>
-          <a:p>
-            <a:pPr marL="171450" marR="0" indent="-171450" algn="l" defTabSz="914400" rtl="0" eaLnBrk="1" fontAlgn="auto" latinLnBrk="0" hangingPunct="1">
+              <a:t>We read tests every day;</a:t>
+            </a:r>
+          </a:p>
+          <a:p>
+            <a:pPr marL="171450" indent="-171450">
+              <a:buFont typeface="Arial" panose="020B0604020202020204" pitchFamily="34" charset="0"/>
+              <a:buChar char="•"/>
+            </a:pPr>
+            <a:r>
+              <a:rPr lang="en-US" b="0" i="0" baseline="0" dirty="0" smtClean="0"/>
+              <a:t>Can’t understand the </a:t>
+            </a:r>
+            <a:r>
+              <a:rPr lang="en-US" b="0" i="0" baseline="0" dirty="0" smtClean="0"/>
+              <a:t>assertions </a:t>
+            </a:r>
+            <a:r>
+              <a:rPr lang="en-US" b="0" i="0" baseline="0" dirty="0" smtClean="0"/>
+              <a:t>unless </a:t>
+            </a:r>
+            <a:r>
+              <a:rPr lang="en-US" b="0" i="0" baseline="0" dirty="0" smtClean="0"/>
+              <a:t>we understand the context </a:t>
+            </a:r>
+            <a:r>
+              <a:rPr lang="en-US" b="0" i="0" baseline="0" dirty="0" smtClean="0"/>
+              <a:t>too</a:t>
+            </a:r>
+          </a:p>
+          <a:p>
+            <a:pPr marL="171450" indent="-171450">
+              <a:buFont typeface="Arial" panose="020B0604020202020204" pitchFamily="34" charset="0"/>
+              <a:buChar char="•"/>
+            </a:pPr>
+            <a:r>
+              <a:rPr lang="en-US" b="0" i="0" baseline="0" dirty="0" smtClean="0"/>
+              <a:t>Make it as effortless as possible for someone to digest your setup code</a:t>
+            </a:r>
+            <a:endParaRPr lang="en-US" b="0" i="0" baseline="0" dirty="0" smtClean="0"/>
+          </a:p>
+          <a:p>
+            <a:endParaRPr lang="en-US" b="0" i="0" baseline="0" dirty="0" smtClean="0"/>
+          </a:p>
+          <a:p>
+            <a:pPr marL="0" marR="0" indent="0" algn="l" defTabSz="914400" rtl="0" eaLnBrk="1" fontAlgn="auto" latinLnBrk="0" hangingPunct="1">
               <a:lnSpc>
                 <a:spcPct val="100000"/>
               </a:lnSpc>
@@ -4093,7 +4001,7 @@
               <a:buClrTx/>
               <a:buSzTx/>
               <a:buFont typeface="Arial" panose="020B0604020202020204" pitchFamily="34" charset="0"/>
-              <a:buChar char="•"/>
+              <a:buNone/>
               <a:tabLst/>
               <a:defRPr/>
             </a:pPr>
@@ -4672,7 +4580,23 @@
             </a:pPr>
             <a:r>
               <a:rPr lang="en-US" i="0" baseline="0" dirty="0" smtClean="0"/>
-              <a:t>As your software gets more complex, and you add more and more business rules, you end up with a lot of similar tests that differ in subtle, but important, ways.</a:t>
+              <a:t>As </a:t>
+            </a:r>
+            <a:r>
+              <a:rPr lang="en-US" i="0" baseline="0" dirty="0" smtClean="0"/>
+              <a:t>software </a:t>
+            </a:r>
+            <a:r>
+              <a:rPr lang="en-US" i="0" baseline="0" dirty="0" smtClean="0"/>
+              <a:t>gets </a:t>
+            </a:r>
+            <a:r>
+              <a:rPr lang="en-US" i="0" baseline="0" dirty="0" smtClean="0"/>
+              <a:t>complex and you add more rules, </a:t>
+            </a:r>
+            <a:r>
+              <a:rPr lang="en-US" i="0" baseline="0" dirty="0" smtClean="0"/>
+              <a:t>you end up with a lot of similar tests that differ in subtle, but important, ways.</a:t>
             </a:r>
           </a:p>
           <a:p>
@@ -6704,31 +6628,7 @@
                 <a:ea typeface="+mn-ea"/>
                 <a:cs typeface="+mn-cs"/>
               </a:rPr>
-              <a:t>This story begins 6.5 years ago when I had just joined my current employer. We were in the middle of our agile transformation and everyone was super excited about having “user stories” instead of “requirements” and “story points” instead of “estimates”. </a:t>
-            </a:r>
-            <a:r>
-              <a:rPr lang="en-US" sz="1200" kern="1200" dirty="0" smtClean="0">
-                <a:solidFill>
-                  <a:schemeClr val="tx1"/>
-                </a:solidFill>
-                <a:effectLst/>
-                <a:latin typeface="+mn-lt"/>
-                <a:ea typeface="+mn-ea"/>
-                <a:cs typeface="+mn-cs"/>
-              </a:rPr>
-              <a:t>In </a:t>
-            </a:r>
-            <a:r>
-              <a:rPr lang="en-US" sz="1200" kern="1200" dirty="0" smtClean="0">
-                <a:solidFill>
-                  <a:schemeClr val="tx1"/>
-                </a:solidFill>
-                <a:effectLst/>
-                <a:latin typeface="+mn-lt"/>
-                <a:ea typeface="+mn-ea"/>
-                <a:cs typeface="+mn-cs"/>
-              </a:rPr>
-              <a:t>the midst of all that agile euphoria, we decided to require tests for 70% of the code in the new project we were starting.</a:t>
+              <a:t>This story begins 6.5 years ago when I had just joined my current employer. We were in the middle of our agile transformation and everyone was super excited about having “user stories” instead of “requirements” and “story points” instead of “estimates”. In the midst of all that agile euphoria, we decided to require tests for 70% of the code in the new project we were starting.</a:t>
             </a:r>
           </a:p>
           <a:p>
@@ -6915,55 +6815,7 @@
                 <a:ea typeface="+mn-ea"/>
                 <a:cs typeface="+mn-cs"/>
               </a:rPr>
-              <a:t>get written were a nightmare. In one </a:t>
-            </a:r>
-            <a:r>
-              <a:rPr lang="en-US" sz="1200" kern="1200" dirty="0" smtClean="0">
-                <a:solidFill>
-                  <a:schemeClr val="tx1"/>
-                </a:solidFill>
-                <a:effectLst/>
-                <a:latin typeface="+mn-lt"/>
-                <a:ea typeface="+mn-ea"/>
-                <a:cs typeface="+mn-cs"/>
-              </a:rPr>
-              <a:t>case </a:t>
-            </a:r>
-            <a:r>
-              <a:rPr lang="en-US" sz="1200" kern="1200" dirty="0" smtClean="0">
-                <a:solidFill>
-                  <a:schemeClr val="tx1"/>
-                </a:solidFill>
-                <a:effectLst/>
-                <a:latin typeface="+mn-lt"/>
-                <a:ea typeface="+mn-ea"/>
-                <a:cs typeface="+mn-cs"/>
-              </a:rPr>
-              <a:t>I needed to make a minor adjustment to a feature. </a:t>
-            </a:r>
-            <a:r>
-              <a:rPr lang="en-US" sz="1200" kern="1200" dirty="0" smtClean="0">
-                <a:solidFill>
-                  <a:schemeClr val="tx1"/>
-                </a:solidFill>
-                <a:effectLst/>
-                <a:latin typeface="+mn-lt"/>
-                <a:ea typeface="+mn-ea"/>
-                <a:cs typeface="+mn-cs"/>
-              </a:rPr>
-              <a:t>Before </a:t>
-            </a:r>
-            <a:r>
-              <a:rPr lang="en-US" sz="1200" kern="1200" dirty="0" smtClean="0">
-                <a:solidFill>
-                  <a:schemeClr val="tx1"/>
-                </a:solidFill>
-                <a:effectLst/>
-                <a:latin typeface="+mn-lt"/>
-                <a:ea typeface="+mn-ea"/>
-                <a:cs typeface="+mn-cs"/>
-              </a:rPr>
-              <a:t>writing any new code, however, I wanted to learn more about how the feature currently worked and I wanted to write a failing test. So I opened up the file containing the tests and my heart sank when I saw this:  </a:t>
+              <a:t>get written were a nightmare. In one case I needed to make a minor adjustment to a feature. Before writing any new code, however, I wanted to learn more about how the feature currently worked and I wanted to write a failing test. So I opened up the file containing the tests and my heart sank when I saw this:  </a:t>
             </a:r>
           </a:p>
           <a:p>
@@ -7877,57 +7729,7 @@
             </a:r>
           </a:p>
           <a:p>
-            <a:pPr marL="628650" lvl="1" indent="-171450">
-              <a:buFont typeface="Arial" panose="020B0604020202020204" pitchFamily="34" charset="0"/>
-              <a:buChar char="•"/>
-            </a:pPr>
-            <a:r>
-              <a:rPr lang="en-US" baseline="0" dirty="0" smtClean="0"/>
-              <a:t>Doesn’t take a lot of effort</a:t>
-            </a:r>
-          </a:p>
-          <a:p>
-            <a:pPr marL="628650" lvl="1" indent="-171450">
-              <a:buFont typeface="Arial" panose="020B0604020202020204" pitchFamily="34" charset="0"/>
-              <a:buChar char="•"/>
-            </a:pPr>
-            <a:r>
-              <a:rPr lang="en-US" baseline="0" dirty="0" smtClean="0"/>
-              <a:t>Makes a big difference</a:t>
-            </a:r>
-          </a:p>
-          <a:p>
             <a:endParaRPr lang="en-US" baseline="0" dirty="0" smtClean="0"/>
-          </a:p>
-          <a:p>
-            <a:r>
-              <a:rPr lang="en-US" b="1" baseline="0" dirty="0" smtClean="0"/>
-              <a:t>Transition: </a:t>
-            </a:r>
-            <a:br>
-              <a:rPr lang="en-US" b="1" baseline="0" dirty="0" smtClean="0"/>
-            </a:br>
-            <a:endParaRPr lang="en-US" b="1" baseline="0" dirty="0" smtClean="0"/>
-          </a:p>
-          <a:p>
-            <a:pPr marL="171450" indent="-171450">
-              <a:buFont typeface="Arial" panose="020B0604020202020204" pitchFamily="34" charset="0"/>
-              <a:buChar char="•"/>
-            </a:pPr>
-            <a:r>
-              <a:rPr lang="en-US" b="0" baseline="0" dirty="0" smtClean="0"/>
-              <a:t>Important that meaningful data stand out</a:t>
-            </a:r>
-          </a:p>
-          <a:p>
-            <a:pPr marL="171450" indent="-171450">
-              <a:buFont typeface="Arial" panose="020B0604020202020204" pitchFamily="34" charset="0"/>
-              <a:buChar char="•"/>
-            </a:pPr>
-            <a:r>
-              <a:rPr lang="en-US" b="0" baseline="0" dirty="0" smtClean="0"/>
-              <a:t>Also important to downplay data that aren’t as meaningful</a:t>
-            </a:r>
           </a:p>
           <a:p>
             <a:endParaRPr lang="en-US" b="1" baseline="0" dirty="0" smtClean="0"/>
@@ -9066,11 +8868,14 @@
             </a:pPr>
             <a:r>
               <a:rPr lang="en-US" b="0" baseline="0" dirty="0" smtClean="0"/>
-              <a:t>For example, one factory method might return a completed order with an unpaid balance, another might create an insurance policy object with a specific combination of coverages</a:t>
-            </a:r>
-            <a:br>
-              <a:rPr lang="en-US" b="0" baseline="0" dirty="0" smtClean="0"/>
-            </a:br>
+              <a:t>Examples</a:t>
+            </a:r>
+          </a:p>
+          <a:p>
+            <a:pPr marL="628650" lvl="1" indent="-171450">
+              <a:buFont typeface="Arial" panose="020B0604020202020204" pitchFamily="34" charset="0"/>
+              <a:buChar char="•"/>
+            </a:pPr>
             <a:endParaRPr lang="en-US" b="0" baseline="0" dirty="0" smtClean="0"/>
           </a:p>
           <a:p>
@@ -9090,7 +8895,15 @@
             </a:pPr>
             <a:r>
               <a:rPr lang="en-US" b="0" baseline="0" dirty="0" smtClean="0"/>
-              <a:t>As software gets more complex, you need more and more pre-built objects</a:t>
+              <a:t>As software </a:t>
+            </a:r>
+            <a:r>
+              <a:rPr lang="en-US" b="0" baseline="0" dirty="0" smtClean="0"/>
+              <a:t>grows = more </a:t>
+            </a:r>
+            <a:r>
+              <a:rPr lang="en-US" b="0" baseline="0" dirty="0" smtClean="0"/>
+              <a:t>and more pre-built objects</a:t>
             </a:r>
           </a:p>
           <a:p>
@@ -9100,8 +8913,21 @@
             </a:pPr>
             <a:r>
               <a:rPr lang="en-US" b="0" baseline="0" dirty="0" smtClean="0"/>
-              <a:t>As the number of pre-built objects grows it becomes harder to maintain them and harder for developers to choose between them</a:t>
-            </a:r>
+              <a:t>As the number of pre-built objects grows </a:t>
+            </a:r>
+            <a:r>
+              <a:rPr lang="en-US" b="0" baseline="0" dirty="0" smtClean="0"/>
+              <a:t>= harder </a:t>
+            </a:r>
+            <a:r>
+              <a:rPr lang="en-US" b="0" baseline="0" dirty="0" smtClean="0"/>
+              <a:t>to maintain them and </a:t>
+            </a:r>
+            <a:r>
+              <a:rPr lang="en-US" b="0" baseline="0" dirty="0" smtClean="0"/>
+              <a:t>choose</a:t>
+            </a:r>
+            <a:endParaRPr lang="en-US" b="0" baseline="0" dirty="0" smtClean="0"/>
           </a:p>
           <a:p>
             <a:pPr marL="0" lvl="0" indent="0">
@@ -9953,7 +9779,27 @@
             </a:pPr>
             <a:r>
               <a:rPr lang="en-US" baseline="0" dirty="0" smtClean="0"/>
-              <a:t>Rather than large number of factory methods, each returning an object in a different pre-defined state, Test Helpers are static classes that expose a SMALL number of generic factory methods.</a:t>
+              <a:t>Static </a:t>
+            </a:r>
+            <a:r>
+              <a:rPr lang="en-US" baseline="0" dirty="0" smtClean="0"/>
+              <a:t>classes that expose </a:t>
+            </a:r>
+            <a:r>
+              <a:rPr lang="en-US" baseline="0" dirty="0" smtClean="0"/>
+              <a:t>SMALL </a:t>
+            </a:r>
+            <a:r>
+              <a:rPr lang="en-US" baseline="0" dirty="0" smtClean="0"/>
+              <a:t>number of </a:t>
+            </a:r>
+            <a:r>
+              <a:rPr lang="en-US" baseline="0" dirty="0" smtClean="0"/>
+              <a:t>GENERIC factory </a:t>
+            </a:r>
+            <a:r>
+              <a:rPr lang="en-US" baseline="0" dirty="0" smtClean="0"/>
+              <a:t>methods.</a:t>
             </a:r>
           </a:p>
           <a:p>
@@ -10010,37 +9856,24 @@
             </a:r>
           </a:p>
           <a:p>
-            <a:pPr marL="628650" lvl="1" indent="-171450">
+            <a:pPr marL="171450" lvl="0" indent="-171450">
+              <a:buFont typeface="Arial" panose="020B0604020202020204" pitchFamily="34" charset="0"/>
+              <a:buChar char="•"/>
+            </a:pPr>
+            <a:endParaRPr lang="en-US" b="0" baseline="0" dirty="0" smtClean="0"/>
+          </a:p>
+          <a:p>
+            <a:pPr marL="171450" lvl="0" indent="-171450">
               <a:buFont typeface="Arial" panose="020B0604020202020204" pitchFamily="34" charset="0"/>
               <a:buChar char="•"/>
             </a:pPr>
             <a:r>
               <a:rPr lang="en-US" b="0" baseline="0" dirty="0" smtClean="0"/>
-              <a:t>In most cases, expose all major properties</a:t>
-            </a:r>
-          </a:p>
-          <a:p>
-            <a:pPr marL="628650" lvl="1" indent="-171450">
-              <a:buFont typeface="Arial" panose="020B0604020202020204" pitchFamily="34" charset="0"/>
-              <a:buChar char="•"/>
-            </a:pPr>
+              <a:t>Remember </a:t>
+            </a:r>
             <a:r>
               <a:rPr lang="en-US" b="0" baseline="0" dirty="0" smtClean="0"/>
-              <a:t>If class is large, I’ll sometimes only expose the properties I care about right now. It’s easy to add new properties later.</a:t>
-            </a:r>
-            <a:br>
-              <a:rPr lang="en-US" b="0" baseline="0" dirty="0" smtClean="0"/>
-            </a:br>
-            <a:endParaRPr lang="en-US" b="0" baseline="0" dirty="0" smtClean="0"/>
-          </a:p>
-          <a:p>
-            <a:pPr marL="171450" lvl="0" indent="-171450">
-              <a:buFont typeface="Arial" panose="020B0604020202020204" pitchFamily="34" charset="0"/>
-              <a:buChar char="•"/>
-            </a:pPr>
-            <a:r>
-              <a:rPr lang="en-US" b="0" baseline="0" dirty="0" smtClean="0"/>
-              <a:t>Remember – callers should only specify values that impact test outcome</a:t>
+              <a:t>– callers should only specify values that impact test outcome</a:t>
             </a:r>
           </a:p>
           <a:p>
@@ -10326,7 +10159,19 @@
                 <a:ea typeface="+mn-ea"/>
                 <a:cs typeface="+mn-cs"/>
               </a:rPr>
-              <a:t>For example, let’s say you create two different Customers from the helper, one called “target” and one called “distractor”. You then do whatever you’re trying to test, and finally you make an assertion that your method under test returned a result that’s equal to the target customer’s email.</a:t>
+              <a:t>For </a:t>
+            </a:r>
+            <a:r>
+              <a:rPr lang="en-US" sz="1200" kern="1200" dirty="0" smtClean="0">
+                <a:solidFill>
+                  <a:schemeClr val="tx1"/>
+                </a:solidFill>
+                <a:effectLst/>
+                <a:latin typeface="+mn-lt"/>
+                <a:ea typeface="+mn-ea"/>
+                <a:cs typeface="+mn-cs"/>
+              </a:rPr>
+              <a:t>example, let’s say you create two different Customers from the helper, one called “target” and one called “distractor”. You then do whatever you’re trying to test, and finally you make an assertion that your method under test returned a result that’s equal to the target customer’s email.</a:t>
             </a:r>
           </a:p>
           <a:p>
@@ -10992,16 +10837,6 @@
               <a:buChar char="•"/>
             </a:pPr>
             <a:endParaRPr lang="en-US" b="0" i="0" baseline="0" dirty="0" smtClean="0"/>
-          </a:p>
-          <a:p>
-            <a:pPr marL="171450" lvl="0" indent="-171450">
-              <a:buFont typeface="Arial" panose="020B0604020202020204" pitchFamily="34" charset="0"/>
-              <a:buChar char="•"/>
-            </a:pPr>
-            <a:r>
-              <a:rPr lang="en-US" b="0" i="0" baseline="0" dirty="0" smtClean="0"/>
-              <a:t>I may or may not assign unique integers to other fields, it depends on what they are and whether or not this issue of “unexpected equality” violates the principle of least surprise</a:t>
-            </a:r>
           </a:p>
           <a:p>
             <a:pPr marL="171450" lvl="0" indent="-171450">
@@ -16741,7 +16576,7 @@
           <a:p>
             <a:fld id="{75AA6396-395E-4ADA-8EE5-F328BC863A04}" type="datetimeFigureOut">
               <a:rPr lang="en-US" smtClean="0"/>
-              <a:t>4/28/2015</a:t>
+              <a:t>4/29/2015</a:t>
             </a:fld>
             <a:endParaRPr lang="en-US"/>
           </a:p>
@@ -16918,7 +16753,7 @@
           <a:p>
             <a:fld id="{75AA6396-395E-4ADA-8EE5-F328BC863A04}" type="datetimeFigureOut">
               <a:rPr lang="en-US" smtClean="0"/>
-              <a:t>4/28/2015</a:t>
+              <a:t>4/29/2015</a:t>
             </a:fld>
             <a:endParaRPr lang="en-US"/>
           </a:p>
@@ -17098,7 +16933,7 @@
           <a:p>
             <a:fld id="{75AA6396-395E-4ADA-8EE5-F328BC863A04}" type="datetimeFigureOut">
               <a:rPr lang="en-US" smtClean="0"/>
-              <a:t>4/28/2015</a:t>
+              <a:t>4/29/2015</a:t>
             </a:fld>
             <a:endParaRPr lang="en-US"/>
           </a:p>
@@ -17318,7 +17153,7 @@
           <a:p>
             <a:fld id="{75AA6396-395E-4ADA-8EE5-F328BC863A04}" type="datetimeFigureOut">
               <a:rPr lang="en-US" smtClean="0"/>
-              <a:t>4/28/2015</a:t>
+              <a:t>4/29/2015</a:t>
             </a:fld>
             <a:endParaRPr lang="en-US"/>
           </a:p>
@@ -17571,7 +17406,7 @@
           <a:p>
             <a:fld id="{75AA6396-395E-4ADA-8EE5-F328BC863A04}" type="datetimeFigureOut">
               <a:rPr lang="en-US" smtClean="0"/>
-              <a:t>4/28/2015</a:t>
+              <a:t>4/29/2015</a:t>
             </a:fld>
             <a:endParaRPr lang="en-US"/>
           </a:p>
@@ -17810,7 +17645,7 @@
           <a:p>
             <a:fld id="{75AA6396-395E-4ADA-8EE5-F328BC863A04}" type="datetimeFigureOut">
               <a:rPr lang="en-US" smtClean="0"/>
-              <a:t>4/28/2015</a:t>
+              <a:t>4/29/2015</a:t>
             </a:fld>
             <a:endParaRPr lang="en-US"/>
           </a:p>
@@ -18184,7 +18019,7 @@
           <a:p>
             <a:fld id="{75AA6396-395E-4ADA-8EE5-F328BC863A04}" type="datetimeFigureOut">
               <a:rPr lang="en-US" smtClean="0"/>
-              <a:t>4/28/2015</a:t>
+              <a:t>4/29/2015</a:t>
             </a:fld>
             <a:endParaRPr lang="en-US"/>
           </a:p>
@@ -18302,7 +18137,7 @@
           <a:p>
             <a:fld id="{75AA6396-395E-4ADA-8EE5-F328BC863A04}" type="datetimeFigureOut">
               <a:rPr lang="en-US" smtClean="0"/>
-              <a:t>4/28/2015</a:t>
+              <a:t>4/29/2015</a:t>
             </a:fld>
             <a:endParaRPr lang="en-US"/>
           </a:p>
@@ -18397,7 +18232,7 @@
           <a:p>
             <a:fld id="{75AA6396-395E-4ADA-8EE5-F328BC863A04}" type="datetimeFigureOut">
               <a:rPr lang="en-US" smtClean="0"/>
-              <a:t>4/28/2015</a:t>
+              <a:t>4/29/2015</a:t>
             </a:fld>
             <a:endParaRPr lang="en-US"/>
           </a:p>
@@ -18674,7 +18509,7 @@
           <a:p>
             <a:fld id="{75AA6396-395E-4ADA-8EE5-F328BC863A04}" type="datetimeFigureOut">
               <a:rPr lang="en-US" smtClean="0"/>
-              <a:t>4/28/2015</a:t>
+              <a:t>4/29/2015</a:t>
             </a:fld>
             <a:endParaRPr lang="en-US"/>
           </a:p>
@@ -18927,7 +18762,7 @@
           <a:p>
             <a:fld id="{75AA6396-395E-4ADA-8EE5-F328BC863A04}" type="datetimeFigureOut">
               <a:rPr lang="en-US" smtClean="0"/>
-              <a:t>4/28/2015</a:t>
+              <a:t>4/29/2015</a:t>
             </a:fld>
             <a:endParaRPr lang="en-US"/>
           </a:p>
@@ -19140,7 +18975,7 @@
           <a:p>
             <a:fld id="{75AA6396-395E-4ADA-8EE5-F328BC863A04}" type="datetimeFigureOut">
               <a:rPr lang="en-US" smtClean="0"/>
-              <a:t>4/28/2015</a:t>
+              <a:t>4/29/2015</a:t>
             </a:fld>
             <a:endParaRPr lang="en-US"/>
           </a:p>
@@ -23394,11 +23229,11 @@
   <p:clrMapOvr>
     <a:masterClrMapping/>
   </p:clrMapOvr>
-  <mc:AlternateContent xmlns:mc="http://schemas.openxmlformats.org/markup-compatibility/2006">
-    <mc:Choice xmlns:p14="http://schemas.microsoft.com/office/powerpoint/2010/main" Requires="p14">
+  <mc:AlternateContent xmlns:mc="http://schemas.openxmlformats.org/markup-compatibility/2006" xmlns:p14="http://schemas.microsoft.com/office/powerpoint/2010/main">
+    <mc:Choice Requires="p14">
       <p:transition spd="slow" p14:dur="2000"/>
     </mc:Choice>
-    <mc:Fallback>
+    <mc:Fallback xmlns="">
       <p:transition spd="slow"/>
     </mc:Fallback>
   </mc:AlternateContent>
@@ -23569,11 +23404,11 @@
   <p:clrMapOvr>
     <a:masterClrMapping/>
   </p:clrMapOvr>
-  <mc:AlternateContent xmlns:mc="http://schemas.openxmlformats.org/markup-compatibility/2006">
-    <mc:Choice xmlns:p14="http://schemas.microsoft.com/office/powerpoint/2010/main" Requires="p14">
+  <mc:AlternateContent xmlns:mc="http://schemas.openxmlformats.org/markup-compatibility/2006" xmlns:p14="http://schemas.microsoft.com/office/powerpoint/2010/main">
+    <mc:Choice Requires="p14">
       <p:transition spd="slow" p14:dur="2000"/>
     </mc:Choice>
-    <mc:Fallback>
+    <mc:Fallback xmlns="">
       <p:transition spd="slow"/>
     </mc:Fallback>
   </mc:AlternateContent>
@@ -23696,11 +23531,11 @@
   <p:clrMapOvr>
     <a:masterClrMapping/>
   </p:clrMapOvr>
-  <mc:AlternateContent xmlns:mc="http://schemas.openxmlformats.org/markup-compatibility/2006">
-    <mc:Choice xmlns:p14="http://schemas.microsoft.com/office/powerpoint/2010/main" Requires="p14">
+  <mc:AlternateContent xmlns:mc="http://schemas.openxmlformats.org/markup-compatibility/2006" xmlns:p14="http://schemas.microsoft.com/office/powerpoint/2010/main">
+    <mc:Choice Requires="p14">
       <p:transition spd="slow" p14:dur="2000"/>
     </mc:Choice>
-    <mc:Fallback>
+    <mc:Fallback xmlns="">
       <p:transition spd="slow"/>
     </mc:Fallback>
   </mc:AlternateContent>
@@ -23816,11 +23651,11 @@
   <p:clrMapOvr>
     <a:masterClrMapping/>
   </p:clrMapOvr>
-  <mc:AlternateContent xmlns:mc="http://schemas.openxmlformats.org/markup-compatibility/2006">
-    <mc:Choice xmlns:p14="http://schemas.microsoft.com/office/powerpoint/2010/main" Requires="p14">
+  <mc:AlternateContent xmlns:mc="http://schemas.openxmlformats.org/markup-compatibility/2006" xmlns:p14="http://schemas.microsoft.com/office/powerpoint/2010/main">
+    <mc:Choice Requires="p14">
       <p:transition spd="slow" p14:dur="2000"/>
     </mc:Choice>
-    <mc:Fallback>
+    <mc:Fallback xmlns="">
       <p:transition spd="slow"/>
     </mc:Fallback>
   </mc:AlternateContent>
@@ -23936,11 +23771,11 @@
   <p:clrMapOvr>
     <a:masterClrMapping/>
   </p:clrMapOvr>
-  <mc:AlternateContent xmlns:mc="http://schemas.openxmlformats.org/markup-compatibility/2006">
-    <mc:Choice xmlns:p14="http://schemas.microsoft.com/office/powerpoint/2010/main" Requires="p14">
+  <mc:AlternateContent xmlns:mc="http://schemas.openxmlformats.org/markup-compatibility/2006" xmlns:p14="http://schemas.microsoft.com/office/powerpoint/2010/main">
+    <mc:Choice Requires="p14">
       <p:transition spd="slow" p14:dur="2000"/>
     </mc:Choice>
-    <mc:Fallback>
+    <mc:Fallback xmlns="">
       <p:transition spd="slow"/>
     </mc:Fallback>
   </mc:AlternateContent>

</xml_diff>

<commit_message>
Narrative / slide updates - chaos begins
Starting to tear the whole thing apart to move around the narrative.
Pretty disjointed at this point
</commit_message>
<xml_diff>
--- a/POETS - Code Palousa 2015.pptx
+++ b/POETS - Code Palousa 2015.pptx
@@ -304,7 +304,7 @@
           <a:p>
             <a:fld id="{C54A4886-B4AF-42F7-97BE-95CDF82A73E3}" type="datetimeFigureOut">
               <a:rPr lang="en-US" smtClean="0"/>
-              <a:t>4/29/2015</a:t>
+              <a:t>11/12/2016</a:t>
             </a:fld>
             <a:endParaRPr lang="en-US"/>
           </a:p>
@@ -893,19 +893,7 @@
                 <a:ea typeface="+mn-ea"/>
                 <a:cs typeface="+mn-cs"/>
               </a:rPr>
-              <a:t>the </a:t>
-            </a:r>
-            <a:r>
-              <a:rPr lang="en-US" sz="1200" kern="1200" dirty="0" smtClean="0">
-                <a:solidFill>
-                  <a:schemeClr val="tx1"/>
-                </a:solidFill>
-                <a:effectLst/>
-                <a:latin typeface="+mn-lt"/>
-                <a:ea typeface="+mn-ea"/>
-                <a:cs typeface="+mn-cs"/>
-              </a:rPr>
-              <a:t>techniques that we developed</a:t>
+              <a:t>the techniques that we developed</a:t>
             </a:r>
             <a:r>
               <a:rPr lang="en-US" sz="1200" kern="1200" baseline="0" dirty="0" smtClean="0">
@@ -917,31 +905,7 @@
                 <a:ea typeface="+mn-ea"/>
                 <a:cs typeface="+mn-cs"/>
               </a:rPr>
-              <a:t> on that original team and </a:t>
-            </a:r>
-            <a:r>
-              <a:rPr lang="en-US" sz="1200" kern="1200" baseline="0" dirty="0" smtClean="0">
-                <a:solidFill>
-                  <a:schemeClr val="tx1"/>
-                </a:solidFill>
-                <a:effectLst/>
-                <a:latin typeface="+mn-lt"/>
-                <a:ea typeface="+mn-ea"/>
-                <a:cs typeface="+mn-cs"/>
-              </a:rPr>
-              <a:t>evolved </a:t>
-            </a:r>
-            <a:r>
-              <a:rPr lang="en-US" sz="1200" kern="1200" baseline="0" dirty="0" smtClean="0">
-                <a:solidFill>
-                  <a:schemeClr val="tx1"/>
-                </a:solidFill>
-                <a:effectLst/>
-                <a:latin typeface="+mn-lt"/>
-                <a:ea typeface="+mn-ea"/>
-                <a:cs typeface="+mn-cs"/>
-              </a:rPr>
-              <a:t>since then to make our tests as easy to write and maintain as possible.</a:t>
+              <a:t> on that original team and evolved since then to make our tests as easy to write and maintain as possible.</a:t>
             </a:r>
             <a:r>
               <a:rPr lang="en-US" sz="1200" kern="1200" dirty="0" smtClean="0">
@@ -1323,11 +1287,17 @@
             </a:pPr>
             <a:r>
               <a:rPr lang="en-US" baseline="0" dirty="0" smtClean="0"/>
-              <a:t>Objects </a:t>
-            </a:r>
+              <a:t>Objects in memory</a:t>
+            </a:r>
+          </a:p>
+          <a:p>
+            <a:pPr marL="171450" indent="-171450">
+              <a:buFont typeface="Arial" panose="020B0604020202020204" pitchFamily="34" charset="0"/>
+              <a:buChar char="•"/>
+            </a:pPr>
             <a:r>
               <a:rPr lang="en-US" baseline="0" dirty="0" smtClean="0"/>
-              <a:t>in memory</a:t>
+              <a:t>Data in a database, </a:t>
             </a:r>
           </a:p>
           <a:p>
@@ -1337,25 +1307,7 @@
             </a:pPr>
             <a:r>
               <a:rPr lang="en-US" baseline="0" dirty="0" smtClean="0"/>
-              <a:t>Data </a:t>
-            </a:r>
-            <a:r>
-              <a:rPr lang="en-US" baseline="0" dirty="0" smtClean="0"/>
-              <a:t>in a database, </a:t>
-            </a:r>
-          </a:p>
-          <a:p>
-            <a:pPr marL="171450" indent="-171450">
-              <a:buFont typeface="Arial" panose="020B0604020202020204" pitchFamily="34" charset="0"/>
-              <a:buChar char="•"/>
-            </a:pPr>
-            <a:r>
-              <a:rPr lang="en-US" baseline="0" dirty="0" smtClean="0"/>
-              <a:t>Files </a:t>
-            </a:r>
-            <a:r>
-              <a:rPr lang="en-US" baseline="0" dirty="0" smtClean="0"/>
-              <a:t>on disk. </a:t>
+              <a:t>Files on disk. </a:t>
             </a:r>
           </a:p>
           <a:p>
@@ -1377,7 +1329,6 @@
               <a:rPr lang="en-US" baseline="0" dirty="0" smtClean="0"/>
               <a:t>Setup in a single test</a:t>
             </a:r>
-            <a:endParaRPr lang="en-US" baseline="0" dirty="0" smtClean="0"/>
           </a:p>
           <a:p>
             <a:endParaRPr lang="en-US" baseline="0" dirty="0" smtClean="0"/>
@@ -2025,27 +1976,11 @@
             </a:r>
             <a:r>
               <a:rPr lang="en-US" b="0" baseline="0" dirty="0" smtClean="0"/>
-              <a:t> setup code often suffers from “noise” </a:t>
-            </a:r>
-            <a:r>
-              <a:rPr lang="en-US" b="0" baseline="0" dirty="0" smtClean="0"/>
-              <a:t>values – OBSCURE </a:t>
+              <a:t> setup code often suffers from “noise” values – OBSCURE </a:t>
             </a:r>
             <a:r>
               <a:rPr lang="en-US" b="0" dirty="0" smtClean="0"/>
-              <a:t>the </a:t>
-            </a:r>
-            <a:r>
-              <a:rPr lang="en-US" b="0" dirty="0" smtClean="0"/>
-              <a:t>data that actually </a:t>
-            </a:r>
-            <a:r>
-              <a:rPr lang="en-US" b="0" dirty="0" smtClean="0"/>
-              <a:t>IMPACT test </a:t>
-            </a:r>
-            <a:r>
-              <a:rPr lang="en-US" b="0" dirty="0" smtClean="0"/>
-              <a:t>outcome.</a:t>
+              <a:t>the data that actually IMPACT test outcome.</a:t>
             </a:r>
             <a:br>
               <a:rPr lang="en-US" b="0" dirty="0" smtClean="0"/>
@@ -2095,23 +2030,11 @@
             </a:r>
             <a:r>
               <a:rPr lang="en-US" b="0" baseline="0" dirty="0" smtClean="0"/>
-              <a:t> </a:t>
-            </a:r>
-            <a:r>
-              <a:rPr lang="en-US" b="0" baseline="0" dirty="0" smtClean="0"/>
-              <a:t>email </a:t>
-            </a:r>
-            <a:r>
-              <a:rPr lang="en-US" b="0" baseline="0" dirty="0" smtClean="0"/>
-              <a:t>address</a:t>
+              <a:t> email address</a:t>
             </a:r>
             <a:r>
               <a:rPr lang="en-US" b="0" dirty="0" smtClean="0"/>
-              <a:t>, which DOES NOT impact the test outcome, is hard to distinguish from other values that DO impact the </a:t>
-            </a:r>
-            <a:r>
-              <a:rPr lang="en-US" b="0" dirty="0" smtClean="0"/>
-              <a:t>test</a:t>
+              <a:t>, which DOES NOT impact the test outcome, is hard to distinguish from other values that DO impact the test</a:t>
             </a:r>
           </a:p>
           <a:p>
@@ -2129,11 +2052,7 @@
             </a:r>
             <a:r>
               <a:rPr lang="en-US" b="0" dirty="0" smtClean="0"/>
-              <a:t>work </a:t>
-            </a:r>
-            <a:r>
-              <a:rPr lang="en-US" b="0" dirty="0" smtClean="0"/>
-              <a:t>harder to</a:t>
+              <a:t>work harder to</a:t>
             </a:r>
             <a:r>
               <a:rPr lang="en-US" b="0" baseline="0" dirty="0" smtClean="0"/>
@@ -2172,27 +2091,7 @@
             </a:pPr>
             <a:r>
               <a:rPr lang="en-US" b="0" baseline="0" dirty="0" smtClean="0"/>
-              <a:t>Clearly </a:t>
-            </a:r>
-            <a:r>
-              <a:rPr lang="en-US" b="0" baseline="0" dirty="0" smtClean="0"/>
-              <a:t>communicate </a:t>
-            </a:r>
-            <a:r>
-              <a:rPr lang="en-US" b="0" baseline="0" dirty="0" smtClean="0"/>
-              <a:t>conditions </a:t>
-            </a:r>
-            <a:r>
-              <a:rPr lang="en-US" b="0" baseline="0" dirty="0" smtClean="0"/>
-              <a:t>under which </a:t>
-            </a:r>
-            <a:r>
-              <a:rPr lang="en-US" b="0" baseline="0" dirty="0" smtClean="0"/>
-              <a:t>assertions </a:t>
-            </a:r>
-            <a:r>
-              <a:rPr lang="en-US" b="0" baseline="0" dirty="0" smtClean="0"/>
-              <a:t>hold true</a:t>
+              <a:t>Clearly communicate conditions under which assertions hold true</a:t>
             </a:r>
           </a:p>
           <a:p>
@@ -2203,10 +2102,6 @@
             <a:r>
               <a:rPr lang="en-US" b="0" baseline="0" dirty="0" smtClean="0"/>
               <a:t>Literal values in setup should be significant or removed</a:t>
-            </a:r>
-            <a:r>
-              <a:rPr lang="en-US" b="0" baseline="0" dirty="0" smtClean="0"/>
-              <a:t/>
             </a:r>
             <a:br>
               <a:rPr lang="en-US" b="0" baseline="0" dirty="0" smtClean="0"/>
@@ -2297,13 +2192,8 @@
           <a:p>
             <a:r>
               <a:rPr lang="en-US" b="0" i="0" baseline="0" dirty="0" smtClean="0"/>
-              <a:t>Finally, poor setup code is often full of duplication, OR it </a:t>
-            </a:r>
-            <a:r>
-              <a:rPr lang="en-US" b="0" i="0" baseline="0" dirty="0" smtClean="0"/>
-              <a:t>incorrectly reuses that logic</a:t>
-            </a:r>
-            <a:endParaRPr lang="en-US" b="0" i="0" baseline="0" dirty="0" smtClean="0"/>
+              <a:t>Finally, poor setup code is often full of duplication, OR it incorrectly reuses that logic</a:t>
+            </a:r>
           </a:p>
           <a:p>
             <a:endParaRPr lang="en-US" b="0" i="0" baseline="0" dirty="0" smtClean="0"/>
@@ -2320,15 +2210,7 @@
           <a:p>
             <a:r>
               <a:rPr lang="en-US" b="0" i="0" baseline="0" dirty="0" smtClean="0"/>
-              <a:t>When logic is incorrectly reused, </a:t>
-            </a:r>
-            <a:r>
-              <a:rPr lang="en-US" b="0" i="0" baseline="0" dirty="0" smtClean="0"/>
-              <a:t>it’s </a:t>
-            </a:r>
-            <a:r>
-              <a:rPr lang="en-US" b="0" i="0" baseline="0" dirty="0" smtClean="0"/>
-              <a:t>harder to maintain.</a:t>
+              <a:t>When logic is incorrectly reused, it’s harder to maintain.</a:t>
             </a:r>
             <a:br>
               <a:rPr lang="en-US" b="0" i="0" baseline="0" dirty="0" smtClean="0"/>
@@ -2358,11 +2240,7 @@
           <a:p>
             <a:r>
               <a:rPr lang="en-US" b="1" dirty="0" smtClean="0"/>
-              <a:t>Transition</a:t>
-            </a:r>
-            <a:r>
-              <a:rPr lang="en-US" b="1" dirty="0" smtClean="0"/>
-              <a:t>:</a:t>
+              <a:t>Transition:</a:t>
             </a:r>
             <a:r>
               <a:rPr lang="en-US" b="1" baseline="0" dirty="0" smtClean="0"/>
@@ -2608,8 +2486,14 @@
                 <a:ea typeface="+mn-ea"/>
                 <a:cs typeface="+mn-cs"/>
               </a:rPr>
-              <a:t>Suck up </a:t>
-            </a:r>
+              <a:t>Suck up TIME when too hard to READ or UNDERSTAND</a:t>
+            </a:r>
+          </a:p>
+          <a:p>
+            <a:pPr marL="171450" indent="-171450">
+              <a:buFont typeface="Arial" panose="020B0604020202020204" pitchFamily="34" charset="0"/>
+              <a:buChar char="•"/>
+            </a:pPr>
             <a:r>
               <a:rPr lang="en-US" sz="1200" kern="1200" baseline="0" dirty="0" smtClean="0">
                 <a:solidFill>
@@ -2620,8 +2504,14 @@
                 <a:ea typeface="+mn-ea"/>
                 <a:cs typeface="+mn-cs"/>
               </a:rPr>
-              <a:t>TIME </a:t>
-            </a:r>
+              <a:t>Suck up MONEY, or company’s money, when hard to maintain</a:t>
+            </a:r>
+          </a:p>
+          <a:p>
+            <a:pPr marL="171450" indent="-171450">
+              <a:buFont typeface="Arial" panose="020B0604020202020204" pitchFamily="34" charset="0"/>
+              <a:buChar char="•"/>
+            </a:pPr>
             <a:r>
               <a:rPr lang="en-US" sz="1200" kern="1200" baseline="0" dirty="0" smtClean="0">
                 <a:solidFill>
@@ -2632,184 +2522,7 @@
                 <a:ea typeface="+mn-ea"/>
                 <a:cs typeface="+mn-cs"/>
               </a:rPr>
-              <a:t>when too hard to READ or UNDERSTAND</a:t>
-            </a:r>
-          </a:p>
-          <a:p>
-            <a:pPr marL="171450" indent="-171450">
-              <a:buFont typeface="Arial" panose="020B0604020202020204" pitchFamily="34" charset="0"/>
-              <a:buChar char="•"/>
-            </a:pPr>
-            <a:r>
-              <a:rPr lang="en-US" sz="1200" kern="1200" baseline="0" dirty="0" smtClean="0">
-                <a:solidFill>
-                  <a:schemeClr val="tx1"/>
-                </a:solidFill>
-                <a:effectLst/>
-                <a:latin typeface="+mn-lt"/>
-                <a:ea typeface="+mn-ea"/>
-                <a:cs typeface="+mn-cs"/>
-              </a:rPr>
-              <a:t>Suck up </a:t>
-            </a:r>
-            <a:r>
-              <a:rPr lang="en-US" sz="1200" kern="1200" baseline="0" dirty="0" smtClean="0">
-                <a:solidFill>
-                  <a:schemeClr val="tx1"/>
-                </a:solidFill>
-                <a:effectLst/>
-                <a:latin typeface="+mn-lt"/>
-                <a:ea typeface="+mn-ea"/>
-                <a:cs typeface="+mn-cs"/>
-              </a:rPr>
-              <a:t>MONEY</a:t>
-            </a:r>
-            <a:r>
-              <a:rPr lang="en-US" sz="1200" kern="1200" baseline="0" dirty="0" smtClean="0">
-                <a:solidFill>
-                  <a:schemeClr val="tx1"/>
-                </a:solidFill>
-                <a:effectLst/>
-                <a:latin typeface="+mn-lt"/>
-                <a:ea typeface="+mn-ea"/>
-                <a:cs typeface="+mn-cs"/>
-              </a:rPr>
-              <a:t>, or </a:t>
-            </a:r>
-            <a:r>
-              <a:rPr lang="en-US" sz="1200" kern="1200" baseline="0" dirty="0" smtClean="0">
-                <a:solidFill>
-                  <a:schemeClr val="tx1"/>
-                </a:solidFill>
-                <a:effectLst/>
-                <a:latin typeface="+mn-lt"/>
-                <a:ea typeface="+mn-ea"/>
-                <a:cs typeface="+mn-cs"/>
-              </a:rPr>
-              <a:t>company’s </a:t>
-            </a:r>
-            <a:r>
-              <a:rPr lang="en-US" sz="1200" kern="1200" baseline="0" dirty="0" smtClean="0">
-                <a:solidFill>
-                  <a:schemeClr val="tx1"/>
-                </a:solidFill>
-                <a:effectLst/>
-                <a:latin typeface="+mn-lt"/>
-                <a:ea typeface="+mn-ea"/>
-                <a:cs typeface="+mn-cs"/>
-              </a:rPr>
-              <a:t>money, when </a:t>
-            </a:r>
-            <a:r>
-              <a:rPr lang="en-US" sz="1200" kern="1200" baseline="0" dirty="0" smtClean="0">
-                <a:solidFill>
-                  <a:schemeClr val="tx1"/>
-                </a:solidFill>
-                <a:effectLst/>
-                <a:latin typeface="+mn-lt"/>
-                <a:ea typeface="+mn-ea"/>
-                <a:cs typeface="+mn-cs"/>
-              </a:rPr>
-              <a:t>hard to maintain</a:t>
-            </a:r>
-            <a:endParaRPr lang="en-US" sz="1200" kern="1200" baseline="0" dirty="0" smtClean="0">
-              <a:solidFill>
-                <a:schemeClr val="tx1"/>
-              </a:solidFill>
-              <a:effectLst/>
-              <a:latin typeface="+mn-lt"/>
-              <a:ea typeface="+mn-ea"/>
-              <a:cs typeface="+mn-cs"/>
-            </a:endParaRPr>
-          </a:p>
-          <a:p>
-            <a:pPr marL="171450" indent="-171450">
-              <a:buFont typeface="Arial" panose="020B0604020202020204" pitchFamily="34" charset="0"/>
-              <a:buChar char="•"/>
-            </a:pPr>
-            <a:r>
-              <a:rPr lang="en-US" sz="1200" kern="1200" baseline="0" dirty="0" smtClean="0">
-                <a:solidFill>
-                  <a:schemeClr val="tx1"/>
-                </a:solidFill>
-                <a:effectLst/>
-                <a:latin typeface="+mn-lt"/>
-                <a:ea typeface="+mn-ea"/>
-                <a:cs typeface="+mn-cs"/>
-              </a:rPr>
-              <a:t>Cause </a:t>
-            </a:r>
-            <a:r>
-              <a:rPr lang="en-US" sz="1200" kern="1200" baseline="0" dirty="0" smtClean="0">
-                <a:solidFill>
-                  <a:schemeClr val="tx1"/>
-                </a:solidFill>
-                <a:effectLst/>
-                <a:latin typeface="+mn-lt"/>
-                <a:ea typeface="+mn-ea"/>
-                <a:cs typeface="+mn-cs"/>
-              </a:rPr>
-              <a:t>frustration </a:t>
-            </a:r>
-            <a:r>
-              <a:rPr lang="en-US" sz="1200" kern="1200" baseline="0" dirty="0" smtClean="0">
-                <a:solidFill>
-                  <a:schemeClr val="tx1"/>
-                </a:solidFill>
-                <a:effectLst/>
-                <a:latin typeface="+mn-lt"/>
-                <a:ea typeface="+mn-ea"/>
-                <a:cs typeface="+mn-cs"/>
-              </a:rPr>
-              <a:t>when </a:t>
-            </a:r>
-            <a:r>
-              <a:rPr lang="en-US" sz="1200" kern="1200" baseline="0" dirty="0" smtClean="0">
-                <a:solidFill>
-                  <a:schemeClr val="tx1"/>
-                </a:solidFill>
-                <a:effectLst/>
-                <a:latin typeface="+mn-lt"/>
-                <a:ea typeface="+mn-ea"/>
-                <a:cs typeface="+mn-cs"/>
-              </a:rPr>
-              <a:t>harder </a:t>
-            </a:r>
-            <a:r>
-              <a:rPr lang="en-US" sz="1200" kern="1200" baseline="0" dirty="0" smtClean="0">
-                <a:solidFill>
-                  <a:schemeClr val="tx1"/>
-                </a:solidFill>
-                <a:effectLst/>
-                <a:latin typeface="+mn-lt"/>
-                <a:ea typeface="+mn-ea"/>
-                <a:cs typeface="+mn-cs"/>
-              </a:rPr>
-              <a:t>than </a:t>
-            </a:r>
-            <a:r>
-              <a:rPr lang="en-US" sz="1200" kern="1200" baseline="0" dirty="0" smtClean="0">
-                <a:solidFill>
-                  <a:schemeClr val="tx1"/>
-                </a:solidFill>
-                <a:effectLst/>
-                <a:latin typeface="+mn-lt"/>
-                <a:ea typeface="+mn-ea"/>
-                <a:cs typeface="+mn-cs"/>
-              </a:rPr>
-              <a:t>should </a:t>
-            </a:r>
-            <a:r>
-              <a:rPr lang="en-US" sz="1200" kern="1200" baseline="0" dirty="0" smtClean="0">
-                <a:solidFill>
-                  <a:schemeClr val="tx1"/>
-                </a:solidFill>
-                <a:effectLst/>
-                <a:latin typeface="+mn-lt"/>
-                <a:ea typeface="+mn-ea"/>
-                <a:cs typeface="+mn-cs"/>
-              </a:rPr>
-              <a:t>be to WRITE NEW tests</a:t>
+              <a:t>Cause frustration when harder than should be to WRITE NEW tests</a:t>
             </a:r>
           </a:p>
           <a:p>
@@ -2846,8 +2559,14 @@
                 <a:ea typeface="+mn-ea"/>
                 <a:cs typeface="+mn-cs"/>
               </a:rPr>
-              <a:t> based on years of experience </a:t>
-            </a:r>
+              <a:t> based on years of experience in the trenches</a:t>
+            </a:r>
+          </a:p>
+          <a:p>
+            <a:pPr marL="171450" indent="-171450">
+              <a:buFont typeface="Arial" panose="020B0604020202020204" pitchFamily="34" charset="0"/>
+              <a:buChar char="•"/>
+            </a:pPr>
             <a:r>
               <a:rPr lang="en-US" sz="1200" kern="1200" baseline="0" dirty="0" smtClean="0">
                 <a:solidFill>
@@ -2858,8 +2577,14 @@
                 <a:ea typeface="+mn-ea"/>
                 <a:cs typeface="+mn-cs"/>
               </a:rPr>
-              <a:t>in </a:t>
-            </a:r>
+              <a:t>Gritted my teeth - took longer to WRITE SINGLE TEST than to implement feature. </a:t>
+            </a:r>
+          </a:p>
+          <a:p>
+            <a:pPr marL="171450" indent="-171450">
+              <a:buFont typeface="Arial" panose="020B0604020202020204" pitchFamily="34" charset="0"/>
+              <a:buChar char="•"/>
+            </a:pPr>
             <a:r>
               <a:rPr lang="en-US" sz="1200" kern="1200" baseline="0" dirty="0" smtClean="0">
                 <a:solidFill>
@@ -2870,8 +2595,14 @@
                 <a:ea typeface="+mn-ea"/>
                 <a:cs typeface="+mn-cs"/>
               </a:rPr>
-              <a:t>the </a:t>
-            </a:r>
+              <a:t>Overwhelmed by confusion trying to UNDERSTAND 3 screens of setup logic. </a:t>
+            </a:r>
+          </a:p>
+          <a:p>
+            <a:pPr marL="171450" indent="-171450">
+              <a:buFont typeface="Arial" panose="020B0604020202020204" pitchFamily="34" charset="0"/>
+              <a:buChar char="•"/>
+            </a:pPr>
             <a:r>
               <a:rPr lang="en-US" sz="1200" kern="1200" baseline="0" dirty="0" smtClean="0">
                 <a:solidFill>
@@ -2882,212 +2613,8 @@
                 <a:ea typeface="+mn-ea"/>
                 <a:cs typeface="+mn-cs"/>
               </a:rPr>
-              <a:t>trenches</a:t>
-            </a:r>
-            <a:endParaRPr lang="en-US" sz="1200" kern="1200" baseline="0" dirty="0" smtClean="0">
-              <a:solidFill>
-                <a:schemeClr val="tx1"/>
-              </a:solidFill>
-              <a:effectLst/>
-              <a:latin typeface="+mn-lt"/>
-              <a:ea typeface="+mn-ea"/>
-              <a:cs typeface="+mn-cs"/>
-            </a:endParaRPr>
-          </a:p>
-          <a:p>
-            <a:pPr marL="171450" indent="-171450">
-              <a:buFont typeface="Arial" panose="020B0604020202020204" pitchFamily="34" charset="0"/>
-              <a:buChar char="•"/>
-            </a:pPr>
-            <a:r>
-              <a:rPr lang="en-US" sz="1200" kern="1200" baseline="0" dirty="0" smtClean="0">
-                <a:solidFill>
-                  <a:schemeClr val="tx1"/>
-                </a:solidFill>
-                <a:effectLst/>
-                <a:latin typeface="+mn-lt"/>
-                <a:ea typeface="+mn-ea"/>
-                <a:cs typeface="+mn-cs"/>
-              </a:rPr>
-              <a:t>Gritted my teeth </a:t>
-            </a:r>
-            <a:r>
-              <a:rPr lang="en-US" sz="1200" kern="1200" baseline="0" dirty="0" smtClean="0">
-                <a:solidFill>
-                  <a:schemeClr val="tx1"/>
-                </a:solidFill>
-                <a:effectLst/>
-                <a:latin typeface="+mn-lt"/>
-                <a:ea typeface="+mn-ea"/>
-                <a:cs typeface="+mn-cs"/>
-              </a:rPr>
-              <a:t>- took longer to WRITE SINGLE TEST than to </a:t>
-            </a:r>
-            <a:r>
-              <a:rPr lang="en-US" sz="1200" kern="1200" baseline="0" dirty="0" smtClean="0">
-                <a:solidFill>
-                  <a:schemeClr val="tx1"/>
-                </a:solidFill>
-                <a:effectLst/>
-                <a:latin typeface="+mn-lt"/>
-                <a:ea typeface="+mn-ea"/>
-                <a:cs typeface="+mn-cs"/>
-              </a:rPr>
-              <a:t>implement </a:t>
-            </a:r>
-            <a:r>
-              <a:rPr lang="en-US" sz="1200" kern="1200" baseline="0" dirty="0" smtClean="0">
-                <a:solidFill>
-                  <a:schemeClr val="tx1"/>
-                </a:solidFill>
-                <a:effectLst/>
-                <a:latin typeface="+mn-lt"/>
-                <a:ea typeface="+mn-ea"/>
-                <a:cs typeface="+mn-cs"/>
-              </a:rPr>
-              <a:t>feature</a:t>
-            </a:r>
-            <a:r>
-              <a:rPr lang="en-US" sz="1200" kern="1200" baseline="0" dirty="0" smtClean="0">
-                <a:solidFill>
-                  <a:schemeClr val="tx1"/>
-                </a:solidFill>
-                <a:effectLst/>
-                <a:latin typeface="+mn-lt"/>
-                <a:ea typeface="+mn-ea"/>
-                <a:cs typeface="+mn-cs"/>
-              </a:rPr>
-              <a:t>. </a:t>
-            </a:r>
-          </a:p>
-          <a:p>
-            <a:pPr marL="171450" indent="-171450">
-              <a:buFont typeface="Arial" panose="020B0604020202020204" pitchFamily="34" charset="0"/>
-              <a:buChar char="•"/>
-            </a:pPr>
-            <a:r>
-              <a:rPr lang="en-US" sz="1200" kern="1200" baseline="0" dirty="0" smtClean="0">
-                <a:solidFill>
-                  <a:schemeClr val="tx1"/>
-                </a:solidFill>
-                <a:effectLst/>
-                <a:latin typeface="+mn-lt"/>
-                <a:ea typeface="+mn-ea"/>
-                <a:cs typeface="+mn-cs"/>
-              </a:rPr>
-              <a:t>Overwhelmed </a:t>
-            </a:r>
-            <a:r>
-              <a:rPr lang="en-US" sz="1200" kern="1200" baseline="0" dirty="0" smtClean="0">
-                <a:solidFill>
-                  <a:schemeClr val="tx1"/>
-                </a:solidFill>
-                <a:effectLst/>
-                <a:latin typeface="+mn-lt"/>
-                <a:ea typeface="+mn-ea"/>
-                <a:cs typeface="+mn-cs"/>
-              </a:rPr>
-              <a:t>by confusion </a:t>
-            </a:r>
-            <a:r>
-              <a:rPr lang="en-US" sz="1200" kern="1200" baseline="0" dirty="0" smtClean="0">
-                <a:solidFill>
-                  <a:schemeClr val="tx1"/>
-                </a:solidFill>
-                <a:effectLst/>
-                <a:latin typeface="+mn-lt"/>
-                <a:ea typeface="+mn-ea"/>
-                <a:cs typeface="+mn-cs"/>
-              </a:rPr>
-              <a:t>trying </a:t>
-            </a:r>
-            <a:r>
-              <a:rPr lang="en-US" sz="1200" kern="1200" baseline="0" dirty="0" smtClean="0">
-                <a:solidFill>
-                  <a:schemeClr val="tx1"/>
-                </a:solidFill>
-                <a:effectLst/>
-                <a:latin typeface="+mn-lt"/>
-                <a:ea typeface="+mn-ea"/>
-                <a:cs typeface="+mn-cs"/>
-              </a:rPr>
-              <a:t>to </a:t>
-            </a:r>
-            <a:r>
-              <a:rPr lang="en-US" sz="1200" kern="1200" baseline="0" dirty="0" smtClean="0">
-                <a:solidFill>
-                  <a:schemeClr val="tx1"/>
-                </a:solidFill>
-                <a:effectLst/>
-                <a:latin typeface="+mn-lt"/>
-                <a:ea typeface="+mn-ea"/>
-                <a:cs typeface="+mn-cs"/>
-              </a:rPr>
-              <a:t>UNDERSTAND 3 screens </a:t>
-            </a:r>
-            <a:r>
-              <a:rPr lang="en-US" sz="1200" kern="1200" baseline="0" dirty="0" smtClean="0">
-                <a:solidFill>
-                  <a:schemeClr val="tx1"/>
-                </a:solidFill>
-                <a:effectLst/>
-                <a:latin typeface="+mn-lt"/>
-                <a:ea typeface="+mn-ea"/>
-                <a:cs typeface="+mn-cs"/>
-              </a:rPr>
-              <a:t>of setup logic. </a:t>
-            </a:r>
-          </a:p>
-          <a:p>
-            <a:pPr marL="171450" indent="-171450">
-              <a:buFont typeface="Arial" panose="020B0604020202020204" pitchFamily="34" charset="0"/>
-              <a:buChar char="•"/>
-            </a:pPr>
-            <a:r>
-              <a:rPr lang="en-US" sz="1200" kern="1200" baseline="0" dirty="0" smtClean="0">
-                <a:solidFill>
-                  <a:schemeClr val="tx1"/>
-                </a:solidFill>
-                <a:effectLst/>
-                <a:latin typeface="+mn-lt"/>
-                <a:ea typeface="+mn-ea"/>
-                <a:cs typeface="+mn-cs"/>
-              </a:rPr>
-              <a:t>SKIPPED writing valuable </a:t>
-            </a:r>
-            <a:r>
-              <a:rPr lang="en-US" sz="1200" kern="1200" baseline="0" dirty="0" smtClean="0">
-                <a:solidFill>
-                  <a:schemeClr val="tx1"/>
-                </a:solidFill>
-                <a:effectLst/>
-                <a:latin typeface="+mn-lt"/>
-                <a:ea typeface="+mn-ea"/>
-                <a:cs typeface="+mn-cs"/>
-              </a:rPr>
-              <a:t>test because it would have been too </a:t>
-            </a:r>
-            <a:r>
-              <a:rPr lang="en-US" sz="1200" kern="1200" baseline="0" dirty="0" smtClean="0">
-                <a:solidFill>
-                  <a:schemeClr val="tx1"/>
-                </a:solidFill>
-                <a:effectLst/>
-                <a:latin typeface="+mn-lt"/>
-                <a:ea typeface="+mn-ea"/>
-                <a:cs typeface="+mn-cs"/>
-              </a:rPr>
-              <a:t>costly</a:t>
-            </a:r>
-            <a:endParaRPr lang="en-US" sz="1200" kern="1200" baseline="0" dirty="0" smtClean="0">
-              <a:solidFill>
-                <a:schemeClr val="tx1"/>
-              </a:solidFill>
-              <a:effectLst/>
-              <a:latin typeface="+mn-lt"/>
-              <a:ea typeface="+mn-ea"/>
-              <a:cs typeface="+mn-cs"/>
-            </a:endParaRPr>
+              <a:t>SKIPPED writing valuable test because it would have been too costly</a:t>
+            </a:r>
           </a:p>
           <a:p>
             <a:endParaRPr lang="en-US" sz="1200" kern="1200" baseline="0" dirty="0" smtClean="0">
@@ -4294,15 +3821,7 @@
             </a:pPr>
             <a:r>
               <a:rPr lang="en-US" b="0" i="0" baseline="0" dirty="0" smtClean="0"/>
-              <a:t>Means that other developers should be able to read and understand our setup code with as </a:t>
-            </a:r>
-            <a:r>
-              <a:rPr lang="en-US" b="0" i="0" baseline="0" dirty="0" smtClean="0"/>
-              <a:t>MINIMAL EFFORT as </a:t>
-            </a:r>
-            <a:r>
-              <a:rPr lang="en-US" b="0" i="0" baseline="0" dirty="0" smtClean="0"/>
-              <a:t>possible</a:t>
+              <a:t>Means that other developers should be able to read and understand our setup code with as MINIMAL EFFORT as possible</a:t>
             </a:r>
           </a:p>
           <a:p>
@@ -4430,11 +3949,7 @@
             </a:pPr>
             <a:r>
               <a:rPr lang="en-US" b="0" i="0" baseline="0" dirty="0" smtClean="0"/>
-              <a:t>Removed unnecessary </a:t>
-            </a:r>
-            <a:r>
-              <a:rPr lang="en-US" b="0" i="0" baseline="0" dirty="0" smtClean="0"/>
-              <a:t>code </a:t>
+              <a:t>Removed unnecessary code </a:t>
             </a:r>
           </a:p>
           <a:p>
@@ -4463,40 +3978,18 @@
             </a:pPr>
             <a:r>
               <a:rPr lang="en-US" b="0" i="0" baseline="0" dirty="0" smtClean="0"/>
-              <a:t>Can’t understand </a:t>
-            </a:r>
+              <a:t>Can’t understand assertions unless we understand context</a:t>
+            </a:r>
+          </a:p>
+          <a:p>
+            <a:pPr marL="171450" indent="-171450">
+              <a:buFont typeface="Arial" panose="020B0604020202020204" pitchFamily="34" charset="0"/>
+              <a:buChar char="•"/>
+            </a:pPr>
             <a:r>
               <a:rPr lang="en-US" b="0" i="0" baseline="0" dirty="0" smtClean="0"/>
-              <a:t>assertions </a:t>
-            </a:r>
-            <a:r>
-              <a:rPr lang="en-US" b="0" i="0" baseline="0" dirty="0" smtClean="0"/>
-              <a:t>unless we understand </a:t>
-            </a:r>
-            <a:r>
-              <a:rPr lang="en-US" b="0" i="0" baseline="0" dirty="0" smtClean="0"/>
-              <a:t>context</a:t>
-            </a:r>
-            <a:endParaRPr lang="en-US" b="0" i="0" baseline="0" dirty="0" smtClean="0"/>
-          </a:p>
-          <a:p>
-            <a:pPr marL="171450" indent="-171450">
-              <a:buFont typeface="Arial" panose="020B0604020202020204" pitchFamily="34" charset="0"/>
-              <a:buChar char="•"/>
-            </a:pPr>
-            <a:r>
-              <a:rPr lang="en-US" b="0" i="0" baseline="0" dirty="0" smtClean="0"/>
-              <a:t>Effortless </a:t>
-            </a:r>
-            <a:r>
-              <a:rPr lang="en-US" b="0" i="0" baseline="0" dirty="0" smtClean="0"/>
-              <a:t>as possible </a:t>
-            </a:r>
-            <a:r>
-              <a:rPr lang="en-US" b="0" i="0" baseline="0" dirty="0" smtClean="0"/>
-              <a:t>to digest</a:t>
-            </a:r>
-            <a:endParaRPr lang="en-US" b="0" i="0" baseline="0" dirty="0" smtClean="0"/>
+              <a:t>Effortless as possible to digest</a:t>
+            </a:r>
           </a:p>
           <a:p>
             <a:endParaRPr lang="en-US" b="0" i="0" baseline="0" dirty="0" smtClean="0"/>
@@ -4741,19 +4234,7 @@
                 <a:ea typeface="+mn-ea"/>
                 <a:cs typeface="+mn-cs"/>
               </a:rPr>
-              <a:t>And I don’t like feeling ashamed when I let my team </a:t>
-            </a:r>
-            <a:r>
-              <a:rPr lang="en-US" sz="1200" kern="1200" baseline="0" dirty="0" smtClean="0">
-                <a:solidFill>
-                  <a:schemeClr val="tx1"/>
-                </a:solidFill>
-                <a:effectLst/>
-                <a:latin typeface="+mn-lt"/>
-                <a:ea typeface="+mn-ea"/>
-                <a:cs typeface="+mn-cs"/>
-              </a:rPr>
-              <a:t>down</a:t>
+              <a:t>And I don’t like feeling ashamed when I let my team down</a:t>
             </a:r>
             <a:endParaRPr lang="en-US" sz="1200" kern="1200" dirty="0" smtClean="0">
               <a:solidFill>
@@ -4812,19 +4293,7 @@
                 <a:ea typeface="+mn-ea"/>
                 <a:cs typeface="+mn-cs"/>
               </a:rPr>
-              <a:t>OUT OF THE DARKNESS and </a:t>
-            </a:r>
-            <a:r>
-              <a:rPr lang="en-US" sz="1200" kern="1200" baseline="0" dirty="0" smtClean="0">
-                <a:solidFill>
-                  <a:schemeClr val="tx1"/>
-                </a:solidFill>
-                <a:effectLst/>
-                <a:latin typeface="+mn-lt"/>
-                <a:ea typeface="+mn-ea"/>
-                <a:cs typeface="+mn-cs"/>
-              </a:rPr>
-              <a:t>into the land of milk, honey and unicorns where tests are easy to write, easy to read, and easy to maintain. </a:t>
+              <a:t>OUT OF THE DARKNESS and into the land of milk, honey and unicorns where tests are easy to write, easy to read, and easy to maintain. </a:t>
             </a:r>
           </a:p>
           <a:p>
@@ -5118,56 +4587,24 @@
             </a:pPr>
             <a:r>
               <a:rPr lang="en-US" i="0" baseline="0" dirty="0" smtClean="0"/>
-              <a:t>Software </a:t>
-            </a:r>
+              <a:t>Software gets complex and you add more rules = lot of similar tests that differ in subtle, but important, ways.</a:t>
+            </a:r>
+          </a:p>
+          <a:p>
+            <a:pPr marL="171450" indent="-171450">
+              <a:buFont typeface="Arial" panose="020B0604020202020204" pitchFamily="34" charset="0"/>
+              <a:buChar char="•"/>
+            </a:pPr>
+            <a:endParaRPr lang="en-US" i="0" baseline="0" dirty="0" smtClean="0"/>
+          </a:p>
+          <a:p>
+            <a:pPr marL="171450" indent="-171450">
+              <a:buFont typeface="Arial" panose="020B0604020202020204" pitchFamily="34" charset="0"/>
+              <a:buChar char="•"/>
+            </a:pPr>
             <a:r>
               <a:rPr lang="en-US" i="0" baseline="0" dirty="0" smtClean="0"/>
-              <a:t>gets complex and you add more </a:t>
-            </a:r>
-            <a:r>
-              <a:rPr lang="en-US" i="0" baseline="0" dirty="0" smtClean="0"/>
-              <a:t>rules = lot </a:t>
-            </a:r>
-            <a:r>
-              <a:rPr lang="en-US" i="0" baseline="0" dirty="0" smtClean="0"/>
-              <a:t>of similar tests that differ in subtle, but important, ways.</a:t>
-            </a:r>
-          </a:p>
-          <a:p>
-            <a:pPr marL="171450" indent="-171450">
-              <a:buFont typeface="Arial" panose="020B0604020202020204" pitchFamily="34" charset="0"/>
-              <a:buChar char="•"/>
-            </a:pPr>
-            <a:endParaRPr lang="en-US" i="0" baseline="0" dirty="0" smtClean="0"/>
-          </a:p>
-          <a:p>
-            <a:pPr marL="171450" indent="-171450">
-              <a:buFont typeface="Arial" panose="020B0604020202020204" pitchFamily="34" charset="0"/>
-              <a:buChar char="•"/>
-            </a:pPr>
-            <a:r>
-              <a:rPr lang="en-US" i="0" baseline="0" dirty="0" smtClean="0"/>
-              <a:t>Easier </a:t>
-            </a:r>
-            <a:r>
-              <a:rPr lang="en-US" i="0" baseline="0" dirty="0" smtClean="0"/>
-              <a:t>to </a:t>
-            </a:r>
-            <a:r>
-              <a:rPr lang="en-US" i="0" baseline="0" dirty="0" smtClean="0"/>
-              <a:t>UNDERSTAND AND MAINTAIN when you </a:t>
-            </a:r>
-            <a:r>
-              <a:rPr lang="en-US" i="0" baseline="0" dirty="0" smtClean="0"/>
-              <a:t>can quickly and </a:t>
-            </a:r>
-            <a:r>
-              <a:rPr lang="en-US" i="0" baseline="0" dirty="0" smtClean="0"/>
-              <a:t>VISUALLY COMPARE them </a:t>
-            </a:r>
-            <a:r>
-              <a:rPr lang="en-US" i="0" baseline="0" dirty="0" smtClean="0"/>
-              <a:t>to see what’s different.</a:t>
+              <a:t>Easier to UNDERSTAND AND MAINTAIN when you can quickly and VISUALLY COMPARE them to see what’s different.</a:t>
             </a:r>
           </a:p>
           <a:p>
@@ -5517,11 +4954,7 @@
             </a:pPr>
             <a:r>
               <a:rPr lang="en-US" b="0" baseline="0" dirty="0" smtClean="0"/>
-              <a:t>Purpose </a:t>
-            </a:r>
-            <a:r>
-              <a:rPr lang="en-US" b="0" baseline="0" dirty="0" smtClean="0"/>
-              <a:t>of this constraint - hyper-focused on the clarity of my setup code. </a:t>
+              <a:t>Purpose of this constraint - hyper-focused on the clarity of my setup code. </a:t>
             </a:r>
             <a:br>
               <a:rPr lang="en-US" b="0" baseline="0" dirty="0" smtClean="0"/>
@@ -5556,8 +4989,14 @@
                 <a:ea typeface="+mn-ea"/>
                 <a:cs typeface="+mn-cs"/>
               </a:rPr>
-              <a:t>Not </a:t>
-            </a:r>
+              <a:t>Not a hard and fast rule</a:t>
+            </a:r>
+          </a:p>
+          <a:p>
+            <a:pPr marL="171450" indent="-171450">
+              <a:buFont typeface="Arial" panose="020B0604020202020204" pitchFamily="34" charset="0"/>
+              <a:buChar char="•"/>
+            </a:pPr>
             <a:r>
               <a:rPr lang="en-US" sz="1200" kern="1200" dirty="0" smtClean="0">
                 <a:solidFill>
@@ -5568,73 +5007,7 @@
                 <a:ea typeface="+mn-ea"/>
                 <a:cs typeface="+mn-cs"/>
               </a:rPr>
-              <a:t>a hard and fast </a:t>
-            </a:r>
-            <a:r>
-              <a:rPr lang="en-US" sz="1200" kern="1200" dirty="0" smtClean="0">
-                <a:solidFill>
-                  <a:schemeClr val="tx1"/>
-                </a:solidFill>
-                <a:effectLst/>
-                <a:latin typeface="+mn-lt"/>
-                <a:ea typeface="+mn-ea"/>
-                <a:cs typeface="+mn-cs"/>
-              </a:rPr>
-              <a:t>rule</a:t>
-            </a:r>
-          </a:p>
-          <a:p>
-            <a:pPr marL="171450" indent="-171450">
-              <a:buFont typeface="Arial" panose="020B0604020202020204" pitchFamily="34" charset="0"/>
-              <a:buChar char="•"/>
-            </a:pPr>
-            <a:r>
-              <a:rPr lang="en-US" sz="1200" kern="1200" dirty="0" smtClean="0">
-                <a:solidFill>
-                  <a:schemeClr val="tx1"/>
-                </a:solidFill>
-                <a:effectLst/>
-                <a:latin typeface="+mn-lt"/>
-                <a:ea typeface="+mn-ea"/>
-                <a:cs typeface="+mn-cs"/>
-              </a:rPr>
-              <a:t>Meet this </a:t>
-            </a:r>
-            <a:r>
-              <a:rPr lang="en-US" sz="1200" kern="1200" dirty="0" smtClean="0">
-                <a:solidFill>
-                  <a:schemeClr val="tx1"/>
-                </a:solidFill>
-                <a:effectLst/>
-                <a:latin typeface="+mn-lt"/>
-                <a:ea typeface="+mn-ea"/>
-                <a:cs typeface="+mn-cs"/>
-              </a:rPr>
-              <a:t>goal </a:t>
-            </a:r>
-            <a:r>
-              <a:rPr lang="en-US" sz="1200" kern="1200" dirty="0" smtClean="0">
-                <a:solidFill>
-                  <a:schemeClr val="tx1"/>
-                </a:solidFill>
-                <a:effectLst/>
-                <a:latin typeface="+mn-lt"/>
-                <a:ea typeface="+mn-ea"/>
-                <a:cs typeface="+mn-cs"/>
-              </a:rPr>
-              <a:t>majority </a:t>
-            </a:r>
-            <a:r>
-              <a:rPr lang="en-US" sz="1200" kern="1200" dirty="0" smtClean="0">
-                <a:solidFill>
-                  <a:schemeClr val="tx1"/>
-                </a:solidFill>
-                <a:effectLst/>
-                <a:latin typeface="+mn-lt"/>
-                <a:ea typeface="+mn-ea"/>
-                <a:cs typeface="+mn-cs"/>
-              </a:rPr>
-              <a:t>of the time.</a:t>
+              <a:t>Meet this goal majority of the time.</a:t>
             </a:r>
           </a:p>
           <a:p>
@@ -7574,40 +6947,24 @@
             </a:r>
             <a:r>
               <a:rPr lang="en-US" baseline="0" dirty="0" smtClean="0"/>
-              <a:t> </a:t>
-            </a:r>
+              <a:t> identify the values or objects in the setup code that ACTUALLY IMPACT the test outcome</a:t>
+            </a:r>
+          </a:p>
+          <a:p>
+            <a:pPr marL="171450" indent="-171450">
+              <a:buFont typeface="Arial" panose="020B0604020202020204" pitchFamily="34" charset="0"/>
+              <a:buChar char="•"/>
+            </a:pPr>
+            <a:endParaRPr lang="en-US" baseline="0" dirty="0" smtClean="0"/>
+          </a:p>
+          <a:p>
+            <a:pPr marL="171450" indent="-171450">
+              <a:buFont typeface="Arial" panose="020B0604020202020204" pitchFamily="34" charset="0"/>
+              <a:buChar char="•"/>
+            </a:pPr>
             <a:r>
               <a:rPr lang="en-US" baseline="0" dirty="0" smtClean="0"/>
-              <a:t>identify the values or objects in the setup code that </a:t>
-            </a:r>
-            <a:r>
-              <a:rPr lang="en-US" baseline="0" dirty="0" smtClean="0"/>
-              <a:t>ACTUALLY IMPACT the </a:t>
-            </a:r>
-            <a:r>
-              <a:rPr lang="en-US" baseline="0" dirty="0" smtClean="0"/>
-              <a:t>test outcome</a:t>
-            </a:r>
-          </a:p>
-          <a:p>
-            <a:pPr marL="171450" indent="-171450">
-              <a:buFont typeface="Arial" panose="020B0604020202020204" pitchFamily="34" charset="0"/>
-              <a:buChar char="•"/>
-            </a:pPr>
-            <a:endParaRPr lang="en-US" baseline="0" dirty="0" smtClean="0"/>
-          </a:p>
-          <a:p>
-            <a:pPr marL="171450" indent="-171450">
-              <a:buFont typeface="Arial" panose="020B0604020202020204" pitchFamily="34" charset="0"/>
-              <a:buChar char="•"/>
-            </a:pPr>
-            <a:r>
-              <a:rPr lang="en-US" baseline="0" dirty="0" smtClean="0"/>
-              <a:t>Clearly </a:t>
-            </a:r>
-            <a:r>
-              <a:rPr lang="en-US" baseline="0" dirty="0" smtClean="0"/>
-              <a:t>communicate HOW and WHY those values impact the test outcome</a:t>
+              <a:t>Clearly communicate HOW and WHY those values impact the test outcome</a:t>
             </a:r>
             <a:br>
               <a:rPr lang="en-US" baseline="0" dirty="0" smtClean="0"/>
@@ -7715,15 +7072,7 @@
             </a:pPr>
             <a:r>
               <a:rPr lang="en-US" b="0" baseline="0" dirty="0" smtClean="0"/>
-              <a:t>The first way to do this is to remove </a:t>
-            </a:r>
-            <a:r>
-              <a:rPr lang="en-US" b="0" baseline="0" dirty="0" smtClean="0"/>
-              <a:t>intermediate </a:t>
-            </a:r>
-            <a:r>
-              <a:rPr lang="en-US" b="0" baseline="0" dirty="0" smtClean="0"/>
-              <a:t>objects and values that don’t impact the test outcome.</a:t>
+              <a:t>The first way to do this is to remove intermediate objects and values that don’t impact the test outcome.</a:t>
             </a:r>
           </a:p>
           <a:p>
@@ -7875,31 +7224,18 @@
             </a:pPr>
             <a:r>
               <a:rPr lang="en-US" b="0" baseline="0" dirty="0" smtClean="0"/>
-              <a:t>Hard to understand </a:t>
-            </a:r>
+              <a:t>Hard to understand when not familiar with those details</a:t>
+            </a:r>
+          </a:p>
+          <a:p>
+            <a:pPr marL="628650" lvl="1" indent="-171450">
+              <a:buFont typeface="Arial" panose="020B0604020202020204" pitchFamily="34" charset="0"/>
+              <a:buChar char="•"/>
+            </a:pPr>
             <a:r>
               <a:rPr lang="en-US" b="0" baseline="0" dirty="0" smtClean="0"/>
-              <a:t>when not familiar </a:t>
-            </a:r>
-            <a:r>
-              <a:rPr lang="en-US" b="0" baseline="0" dirty="0" smtClean="0"/>
-              <a:t>with those details</a:t>
-            </a:r>
-          </a:p>
-          <a:p>
-            <a:pPr marL="628650" lvl="1" indent="-171450">
-              <a:buFont typeface="Arial" panose="020B0604020202020204" pitchFamily="34" charset="0"/>
-              <a:buChar char="•"/>
-            </a:pPr>
-            <a:r>
-              <a:rPr lang="en-US" b="0" baseline="0" dirty="0" smtClean="0"/>
-              <a:t>Hard to figure out </a:t>
-            </a:r>
-            <a:r>
-              <a:rPr lang="en-US" b="0" baseline="0" dirty="0" smtClean="0"/>
-              <a:t>why test started breaking</a:t>
-            </a:r>
-            <a:endParaRPr lang="en-US" b="0" baseline="0" dirty="0" smtClean="0"/>
+              <a:t>Hard to figure out why test started breaking</a:t>
+            </a:r>
           </a:p>
           <a:p>
             <a:pPr marL="171450" lvl="0" indent="-171450">
@@ -8560,113 +7896,70 @@
             </a:r>
             <a:r>
               <a:rPr lang="en-US" baseline="0" dirty="0" smtClean="0"/>
-              <a:t> for </a:t>
-            </a:r>
+              <a:t> for highlighting significant data is to use common naming patterns</a:t>
+            </a:r>
+          </a:p>
+          <a:p>
+            <a:pPr marL="171450" indent="-171450">
+              <a:buFont typeface="Arial" panose="020B0604020202020204" pitchFamily="34" charset="0"/>
+              <a:buChar char="•"/>
+            </a:pPr>
+            <a:endParaRPr lang="en-US" baseline="0" dirty="0" smtClean="0"/>
+          </a:p>
+          <a:p>
+            <a:pPr marL="171450" indent="-171450">
+              <a:buFont typeface="Arial" panose="020B0604020202020204" pitchFamily="34" charset="0"/>
+              <a:buChar char="•"/>
+            </a:pPr>
             <a:r>
               <a:rPr lang="en-US" baseline="0" dirty="0" smtClean="0"/>
-              <a:t>highlighting significant data is to use common naming </a:t>
-            </a:r>
+              <a:t>EX: Tests for search or filter, important to do positive AND negative test</a:t>
+            </a:r>
+          </a:p>
+          <a:p>
+            <a:pPr marL="628650" lvl="1" indent="-171450">
+              <a:buFont typeface="Arial" panose="020B0604020202020204" pitchFamily="34" charset="0"/>
+              <a:buChar char="•"/>
+            </a:pPr>
             <a:r>
               <a:rPr lang="en-US" baseline="0" dirty="0" smtClean="0"/>
-              <a:t>patterns</a:t>
-            </a:r>
-            <a:endParaRPr lang="en-US" baseline="0" dirty="0" smtClean="0"/>
+              <a:t>Just as important code returns the things it should as does NOT return what it shouldn’t</a:t>
+            </a:r>
+            <a:endParaRPr lang="en-US" dirty="0" smtClean="0"/>
+          </a:p>
+          <a:p>
+            <a:endParaRPr lang="en-US" dirty="0" smtClean="0"/>
           </a:p>
           <a:p>
             <a:pPr marL="171450" indent="-171450">
               <a:buFont typeface="Arial" panose="020B0604020202020204" pitchFamily="34" charset="0"/>
               <a:buChar char="•"/>
             </a:pPr>
-            <a:endParaRPr lang="en-US" baseline="0" dirty="0" smtClean="0"/>
-          </a:p>
-          <a:p>
-            <a:pPr marL="171450" indent="-171450">
-              <a:buFont typeface="Arial" panose="020B0604020202020204" pitchFamily="34" charset="0"/>
-              <a:buChar char="•"/>
-            </a:pPr>
             <a:r>
               <a:rPr lang="en-US" baseline="0" dirty="0" smtClean="0"/>
-              <a:t>EX: </a:t>
-            </a:r>
+              <a:t>Convention is to use the term “distractor”</a:t>
+            </a:r>
+            <a:endParaRPr lang="en-US" i="0" baseline="0" dirty="0" smtClean="0"/>
+          </a:p>
+          <a:p>
+            <a:pPr marL="628650" lvl="1" indent="-171450">
+              <a:buFont typeface="Arial" panose="020B0604020202020204" pitchFamily="34" charset="0"/>
+              <a:buChar char="•"/>
+            </a:pPr>
             <a:r>
               <a:rPr lang="en-US" baseline="0" dirty="0" smtClean="0"/>
-              <a:t>Tests </a:t>
-            </a:r>
+              <a:t>Communicates object is not important</a:t>
+            </a:r>
+          </a:p>
+          <a:p>
+            <a:pPr marL="628650" lvl="1" indent="-171450">
+              <a:buFont typeface="Arial" panose="020B0604020202020204" pitchFamily="34" charset="0"/>
+              <a:buChar char="•"/>
+            </a:pPr>
             <a:r>
               <a:rPr lang="en-US" baseline="0" dirty="0" smtClean="0"/>
-              <a:t>for search or filter, important to do positive AND negative test</a:t>
-            </a:r>
-          </a:p>
-          <a:p>
-            <a:pPr marL="628650" lvl="1" indent="-171450">
-              <a:buFont typeface="Arial" panose="020B0604020202020204" pitchFamily="34" charset="0"/>
-              <a:buChar char="•"/>
-            </a:pPr>
-            <a:r>
-              <a:rPr lang="en-US" baseline="0" dirty="0" smtClean="0"/>
-              <a:t>Just as important </a:t>
-            </a:r>
-            <a:r>
-              <a:rPr lang="en-US" baseline="0" dirty="0" smtClean="0"/>
-              <a:t>code </a:t>
-            </a:r>
-            <a:r>
-              <a:rPr lang="en-US" baseline="0" dirty="0" smtClean="0"/>
-              <a:t>returns the things it should as does NOT return what it shouldn’t</a:t>
-            </a:r>
-            <a:endParaRPr lang="en-US" dirty="0" smtClean="0"/>
-          </a:p>
-          <a:p>
-            <a:endParaRPr lang="en-US" dirty="0" smtClean="0"/>
-          </a:p>
-          <a:p>
-            <a:pPr marL="171450" indent="-171450">
-              <a:buFont typeface="Arial" panose="020B0604020202020204" pitchFamily="34" charset="0"/>
-              <a:buChar char="•"/>
-            </a:pPr>
-            <a:r>
-              <a:rPr lang="en-US" baseline="0" dirty="0" smtClean="0"/>
-              <a:t>Convention </a:t>
-            </a:r>
-            <a:r>
-              <a:rPr lang="en-US" baseline="0" dirty="0" smtClean="0"/>
-              <a:t>is to use the term “distractor</a:t>
-            </a:r>
-            <a:r>
-              <a:rPr lang="en-US" baseline="0" dirty="0" smtClean="0"/>
-              <a:t>”</a:t>
-            </a:r>
-            <a:endParaRPr lang="en-US" i="0" baseline="0" dirty="0" smtClean="0"/>
-          </a:p>
-          <a:p>
-            <a:pPr marL="628650" lvl="1" indent="-171450">
-              <a:buFont typeface="Arial" panose="020B0604020202020204" pitchFamily="34" charset="0"/>
-              <a:buChar char="•"/>
-            </a:pPr>
-            <a:r>
-              <a:rPr lang="en-US" baseline="0" dirty="0" smtClean="0"/>
-              <a:t>Communicates object is not </a:t>
-            </a:r>
-            <a:r>
-              <a:rPr lang="en-US" baseline="0" dirty="0" smtClean="0"/>
-              <a:t>important</a:t>
-            </a:r>
-            <a:endParaRPr lang="en-US" baseline="0" dirty="0" smtClean="0"/>
-          </a:p>
-          <a:p>
-            <a:pPr marL="628650" lvl="1" indent="-171450">
-              <a:buFont typeface="Arial" panose="020B0604020202020204" pitchFamily="34" charset="0"/>
-              <a:buChar char="•"/>
-            </a:pPr>
-            <a:r>
-              <a:rPr lang="en-US" baseline="0" dirty="0" smtClean="0"/>
-              <a:t>Use that name consistently, co-workers immediately </a:t>
-            </a:r>
-            <a:r>
-              <a:rPr lang="en-US" baseline="0" dirty="0" smtClean="0"/>
-              <a:t>recognize</a:t>
-            </a:r>
-            <a:endParaRPr lang="en-US" baseline="0" dirty="0" smtClean="0"/>
+              <a:t>Use that name consistently, co-workers immediately recognize</a:t>
+            </a:r>
           </a:p>
           <a:p>
             <a:endParaRPr lang="en-US" baseline="0" dirty="0" smtClean="0"/>
@@ -10012,15 +9305,6 @@
               </a:rPr>
               <a:t> </a:t>
             </a:r>
-            <a:endParaRPr lang="en-US" sz="1200" kern="1200" baseline="0" dirty="0" smtClean="0">
-              <a:solidFill>
-                <a:schemeClr val="tx1"/>
-              </a:solidFill>
-              <a:effectLst/>
-              <a:latin typeface="+mn-lt"/>
-              <a:ea typeface="+mn-ea"/>
-              <a:cs typeface="+mn-cs"/>
-            </a:endParaRPr>
           </a:p>
           <a:p>
             <a:endParaRPr lang="en-US" sz="1200" kern="1200" dirty="0" smtClean="0">
@@ -10286,43 +9570,7 @@
                 <a:ea typeface="+mn-ea"/>
                 <a:cs typeface="+mn-cs"/>
               </a:rPr>
-              <a:t>Not </a:t>
-            </a:r>
-            <a:r>
-              <a:rPr lang="en-US" sz="1200" kern="1200" dirty="0" smtClean="0">
-                <a:solidFill>
-                  <a:schemeClr val="tx1"/>
-                </a:solidFill>
-                <a:effectLst/>
-                <a:latin typeface="+mn-lt"/>
-                <a:ea typeface="+mn-ea"/>
-                <a:cs typeface="+mn-cs"/>
-              </a:rPr>
-              <a:t>a </a:t>
-            </a:r>
-            <a:r>
-              <a:rPr lang="en-US" sz="1200" kern="1200" dirty="0" smtClean="0">
-                <a:solidFill>
-                  <a:schemeClr val="tx1"/>
-                </a:solidFill>
-                <a:effectLst/>
-                <a:latin typeface="+mn-lt"/>
-                <a:ea typeface="+mn-ea"/>
-                <a:cs typeface="+mn-cs"/>
-              </a:rPr>
-              <a:t>fan </a:t>
-            </a:r>
-            <a:r>
-              <a:rPr lang="en-US" sz="1200" kern="1200" dirty="0" smtClean="0">
-                <a:solidFill>
-                  <a:schemeClr val="tx1"/>
-                </a:solidFill>
-                <a:effectLst/>
-                <a:latin typeface="+mn-lt"/>
-                <a:ea typeface="+mn-ea"/>
-                <a:cs typeface="+mn-cs"/>
-              </a:rPr>
-              <a:t>of the Fluent API because it’s very verbose. </a:t>
+              <a:t>Not a fan of the Fluent API because it’s very verbose. </a:t>
             </a:r>
           </a:p>
           <a:p>
@@ -10401,7 +9649,6 @@
               <a:rPr lang="en-US" b="0" baseline="0" dirty="0" smtClean="0"/>
               <a:t>Not happy with results</a:t>
             </a:r>
-            <a:endParaRPr lang="en-US" b="0" baseline="0" dirty="0" smtClean="0"/>
           </a:p>
           <a:p>
             <a:pPr marL="0" lvl="0" indent="0">
@@ -10434,51 +9681,11 @@
             </a:r>
             <a:r>
               <a:rPr lang="en-US" b="0" dirty="0" smtClean="0"/>
-              <a:t> </a:t>
-            </a:r>
-            <a:r>
-              <a:rPr lang="en-US" b="0" dirty="0" smtClean="0"/>
-              <a:t>We </a:t>
-            </a:r>
-            <a:r>
-              <a:rPr lang="en-US" b="0" dirty="0" smtClean="0"/>
-              <a:t>decided </a:t>
-            </a:r>
-            <a:r>
-              <a:rPr lang="en-US" b="0" dirty="0" smtClean="0"/>
-              <a:t>we </a:t>
-            </a:r>
-            <a:r>
-              <a:rPr lang="en-US" b="0" dirty="0" smtClean="0"/>
-              <a:t>wanted something </a:t>
-            </a:r>
-            <a:r>
-              <a:rPr lang="en-US" b="0" dirty="0" smtClean="0"/>
-              <a:t>CONCISE </a:t>
+              <a:t> We decided we wanted something CONCISE </a:t>
             </a:r>
             <a:r>
               <a:rPr lang="en-US" b="0" baseline="0" dirty="0" smtClean="0"/>
-              <a:t>like </a:t>
-            </a:r>
-            <a:r>
-              <a:rPr lang="en-US" b="0" baseline="0" dirty="0" smtClean="0"/>
-              <a:t>Object Mother but </a:t>
-            </a:r>
-            <a:r>
-              <a:rPr lang="en-US" b="0" baseline="0" dirty="0" smtClean="0"/>
-              <a:t>FLEXIBLE like </a:t>
-            </a:r>
-            <a:r>
-              <a:rPr lang="en-US" b="0" baseline="0" dirty="0" smtClean="0"/>
-              <a:t>Data Builder. </a:t>
-            </a:r>
-            <a:r>
-              <a:rPr lang="en-US" b="0" baseline="0" dirty="0" smtClean="0"/>
-              <a:t>Created </a:t>
-            </a:r>
-            <a:r>
-              <a:rPr lang="en-US" b="0" baseline="0" dirty="0" smtClean="0"/>
-              <a:t>a hybrid pattern that takes the best aspects of each.</a:t>
+              <a:t>like Object Mother but FLEXIBLE like Data Builder. Created a hybrid pattern that takes the best aspects of each.</a:t>
             </a:r>
             <a:endParaRPr lang="en-US" b="1" dirty="0" smtClean="0"/>
           </a:p>
@@ -10492,11 +9699,7 @@
           <a:p>
             <a:r>
               <a:rPr lang="en-US" baseline="0" dirty="0" smtClean="0"/>
-              <a:t>We have internally referred to this pattern as “Test Helper”. </a:t>
-            </a:r>
-            <a:r>
-              <a:rPr lang="en-US" baseline="0" dirty="0" smtClean="0"/>
-              <a:t>Name sucks – focus on details of the pattern itself</a:t>
+              <a:t>We have internally referred to this pattern as “Test Helper”. Name sucks – focus on details of the pattern itself</a:t>
             </a:r>
             <a:endParaRPr lang="en-US" b="0" dirty="0" smtClean="0"/>
           </a:p>
@@ -10584,53 +9787,20 @@
           <a:p>
             <a:r>
               <a:rPr lang="en-US" baseline="0" dirty="0" smtClean="0"/>
-              <a:t>“</a:t>
-            </a:r>
+              <a:t>“Test Helper” combines static factory class of Object Mother w/ customizable nature of Data Builder </a:t>
+            </a:r>
+          </a:p>
+          <a:p>
+            <a:endParaRPr lang="en-US" baseline="0" dirty="0" smtClean="0"/>
+          </a:p>
+          <a:p>
+            <a:pPr marL="171450" indent="-171450">
+              <a:buFont typeface="Arial" panose="020B0604020202020204" pitchFamily="34" charset="0"/>
+              <a:buChar char="•"/>
+            </a:pPr>
             <a:r>
               <a:rPr lang="en-US" baseline="0" dirty="0" smtClean="0"/>
-              <a:t>Test Helper” combines </a:t>
-            </a:r>
-            <a:r>
-              <a:rPr lang="en-US" baseline="0" dirty="0" smtClean="0"/>
-              <a:t>static </a:t>
-            </a:r>
-            <a:r>
-              <a:rPr lang="en-US" baseline="0" dirty="0" smtClean="0"/>
-              <a:t>factory class of Object Mother </a:t>
-            </a:r>
-            <a:r>
-              <a:rPr lang="en-US" baseline="0" dirty="0" smtClean="0"/>
-              <a:t>w/ customizable </a:t>
-            </a:r>
-            <a:r>
-              <a:rPr lang="en-US" baseline="0" dirty="0" smtClean="0"/>
-              <a:t>nature of </a:t>
-            </a:r>
-            <a:r>
-              <a:rPr lang="en-US" baseline="0" dirty="0" smtClean="0"/>
-              <a:t>Data Builder </a:t>
-            </a:r>
-            <a:endParaRPr lang="en-US" baseline="0" dirty="0" smtClean="0"/>
-          </a:p>
-          <a:p>
-            <a:endParaRPr lang="en-US" baseline="0" dirty="0" smtClean="0"/>
-          </a:p>
-          <a:p>
-            <a:pPr marL="171450" indent="-171450">
-              <a:buFont typeface="Arial" panose="020B0604020202020204" pitchFamily="34" charset="0"/>
-              <a:buChar char="•"/>
-            </a:pPr>
-            <a:r>
-              <a:rPr lang="en-US" baseline="0" dirty="0" smtClean="0"/>
-              <a:t>Static classes </a:t>
-            </a:r>
-            <a:r>
-              <a:rPr lang="en-US" baseline="0" dirty="0" smtClean="0"/>
-              <a:t>expose </a:t>
-            </a:r>
-            <a:r>
-              <a:rPr lang="en-US" baseline="0" dirty="0" smtClean="0"/>
-              <a:t>SMALL number of GENERIC factory methods.</a:t>
+              <a:t>Static classes expose SMALL number of GENERIC factory methods.</a:t>
             </a:r>
           </a:p>
           <a:p>
@@ -10658,17 +9828,8 @@
             </a:pPr>
             <a:r>
               <a:rPr lang="en-US" b="0" baseline="0" dirty="0" smtClean="0"/>
-              <a:t>Create static </a:t>
-            </a:r>
-            <a:r>
-              <a:rPr lang="en-US" b="0" baseline="0" dirty="0" smtClean="0"/>
-              <a:t>class, one for each </a:t>
-            </a:r>
-            <a:r>
-              <a:rPr lang="en-US" b="0" baseline="0" dirty="0" smtClean="0"/>
-              <a:t>type</a:t>
-            </a:r>
-            <a:endParaRPr lang="en-US" b="0" baseline="0" dirty="0" smtClean="0"/>
+              <a:t>Create static class, one for each type</a:t>
+            </a:r>
           </a:p>
           <a:p>
             <a:pPr marL="628650" lvl="1" indent="-171450">
@@ -10685,25 +9846,8 @@
             </a:r>
             <a:r>
               <a:rPr lang="en-US" b="0" baseline="0" dirty="0" smtClean="0"/>
-              <a:t> </a:t>
-            </a:r>
-            <a:r>
-              <a:rPr lang="en-US" b="0" baseline="0" dirty="0" smtClean="0"/>
-              <a:t>method called Create and </a:t>
-            </a:r>
-            <a:r>
-              <a:rPr lang="en-US" b="0" baseline="0" dirty="0" smtClean="0"/>
-              <a:t>expose </a:t>
-            </a:r>
-            <a:r>
-              <a:rPr lang="en-US" b="0" baseline="0" dirty="0" smtClean="0"/>
-              <a:t>each customizable property as </a:t>
-            </a:r>
-            <a:r>
-              <a:rPr lang="en-US" b="0" baseline="0" dirty="0" smtClean="0"/>
-              <a:t>method parameter</a:t>
-            </a:r>
-            <a:endParaRPr lang="en-US" b="0" baseline="0" dirty="0" smtClean="0"/>
+              <a:t> method called Create and expose each customizable property as method parameter</a:t>
+            </a:r>
           </a:p>
           <a:p>
             <a:pPr marL="171450" lvl="0" indent="-171450">
@@ -11967,45 +11111,17 @@
             </a:r>
             <a:r>
               <a:rPr lang="en-US" baseline="0" dirty="0" smtClean="0"/>
-              <a:t> </a:t>
-            </a:r>
+              <a:t> need to customize object in a way helper wasn’t built to support</a:t>
+            </a:r>
+          </a:p>
+          <a:p>
+            <a:pPr marL="628650" lvl="1" indent="-171450">
+              <a:buFont typeface="Arial" panose="020B0604020202020204" pitchFamily="34" charset="0"/>
+              <a:buChar char="•"/>
+            </a:pPr>
             <a:r>
               <a:rPr lang="en-US" baseline="0" dirty="0" smtClean="0"/>
-              <a:t>need </a:t>
-            </a:r>
-            <a:r>
-              <a:rPr lang="en-US" baseline="0" dirty="0" smtClean="0"/>
-              <a:t>to customize </a:t>
-            </a:r>
-            <a:r>
-              <a:rPr lang="en-US" baseline="0" dirty="0" smtClean="0"/>
-              <a:t>object </a:t>
-            </a:r>
-            <a:r>
-              <a:rPr lang="en-US" baseline="0" dirty="0" smtClean="0"/>
-              <a:t>in a way </a:t>
-            </a:r>
-            <a:r>
-              <a:rPr lang="en-US" baseline="0" dirty="0" smtClean="0"/>
-              <a:t>helper </a:t>
-            </a:r>
-            <a:r>
-              <a:rPr lang="en-US" baseline="0" dirty="0" smtClean="0"/>
-              <a:t>wasn’t built to support</a:t>
-            </a:r>
-          </a:p>
-          <a:p>
-            <a:pPr marL="628650" lvl="1" indent="-171450">
-              <a:buFont typeface="Arial" panose="020B0604020202020204" pitchFamily="34" charset="0"/>
-              <a:buChar char="•"/>
-            </a:pPr>
-            <a:r>
-              <a:rPr lang="en-US" baseline="0" dirty="0" smtClean="0"/>
-              <a:t>Modify properties not exposed </a:t>
-            </a:r>
-            <a:r>
-              <a:rPr lang="en-US" baseline="0" dirty="0" smtClean="0"/>
-              <a:t>as </a:t>
+              <a:t>Modify properties not exposed as </a:t>
             </a:r>
             <a:r>
               <a:rPr lang="en-US" baseline="0" dirty="0" err="1" smtClean="0"/>
@@ -12022,7 +11138,6 @@
               <a:rPr lang="en-US" baseline="0" dirty="0" smtClean="0"/>
               <a:t>Something more complex</a:t>
             </a:r>
-            <a:endParaRPr lang="en-US" baseline="0" dirty="0" smtClean="0"/>
           </a:p>
           <a:p>
             <a:pPr marL="628650" lvl="1" indent="-171450">
@@ -12135,11 +11250,7 @@
             </a:pPr>
             <a:r>
               <a:rPr lang="en-US" baseline="0" dirty="0" smtClean="0"/>
-              <a:t>AVOID </a:t>
-            </a:r>
-            <a:r>
-              <a:rPr lang="en-US" baseline="0" dirty="0" smtClean="0"/>
-              <a:t>this if you can</a:t>
+              <a:t>AVOID this if you can</a:t>
             </a:r>
           </a:p>
           <a:p>
@@ -12345,7 +11456,6 @@
               <a:rPr lang="en-US" baseline="0" dirty="0" smtClean="0"/>
               <a:t>(explain)</a:t>
             </a:r>
-            <a:endParaRPr lang="en-US" baseline="0" dirty="0" smtClean="0"/>
           </a:p>
           <a:p>
             <a:pPr marL="628650" lvl="1" indent="-171450">
@@ -12364,30 +11474,17 @@
             </a:pPr>
             <a:r>
               <a:rPr lang="en-US" baseline="0" dirty="0" smtClean="0"/>
-              <a:t>1) </a:t>
-            </a:r>
+              <a:t>1) Gets messy or complicated if you have lots of logic</a:t>
+            </a:r>
+          </a:p>
+          <a:p>
+            <a:pPr marL="1085850" lvl="2" indent="-171450">
+              <a:buFont typeface="Arial" panose="020B0604020202020204" pitchFamily="34" charset="0"/>
+              <a:buChar char="•"/>
+            </a:pPr>
             <a:r>
               <a:rPr lang="en-US" baseline="0" dirty="0" smtClean="0"/>
-              <a:t>Gets messy or complicated if you have lots of logic</a:t>
-            </a:r>
-            <a:endParaRPr lang="en-US" baseline="0" dirty="0" smtClean="0"/>
-          </a:p>
-          <a:p>
-            <a:pPr marL="1085850" lvl="2" indent="-171450">
-              <a:buFont typeface="Arial" panose="020B0604020202020204" pitchFamily="34" charset="0"/>
-              <a:buChar char="•"/>
-            </a:pPr>
-            <a:r>
-              <a:rPr lang="en-US" baseline="0" dirty="0" smtClean="0"/>
-              <a:t>2) </a:t>
-            </a:r>
-            <a:r>
-              <a:rPr lang="en-US" baseline="0" dirty="0" smtClean="0"/>
-              <a:t>No </a:t>
-            </a:r>
-            <a:r>
-              <a:rPr lang="en-US" baseline="0" dirty="0" smtClean="0"/>
-              <a:t>easy way to search your test code for all places that are creating a Shipped order</a:t>
+              <a:t>2) No easy way to search your test code for all places that are creating a Shipped order</a:t>
             </a:r>
           </a:p>
           <a:p>
@@ -12499,15 +11596,21 @@
           <a:p>
             <a:r>
               <a:rPr lang="en-US" b="0" baseline="0" dirty="0" smtClean="0"/>
-              <a:t>This helper method is </a:t>
-            </a:r>
+              <a:t>This helper method is purpose built for creating shipped orders.</a:t>
+            </a:r>
+          </a:p>
+          <a:p>
+            <a:endParaRPr lang="en-US" b="0" baseline="0" dirty="0" smtClean="0"/>
+          </a:p>
+          <a:p>
+            <a:pPr marL="171450" indent="-171450">
+              <a:buFont typeface="Arial" panose="020B0604020202020204" pitchFamily="34" charset="0"/>
+              <a:buChar char="•"/>
+            </a:pPr>
             <a:r>
               <a:rPr lang="en-US" b="0" baseline="0" dirty="0" smtClean="0"/>
-              <a:t>purpose built for creating shipped orders.</a:t>
-            </a:r>
-          </a:p>
-          <a:p>
-            <a:endParaRPr lang="en-US" b="0" baseline="0" dirty="0" smtClean="0"/>
+              <a:t>no longer need to expose the shipping status as a parameter</a:t>
+            </a:r>
           </a:p>
           <a:p>
             <a:pPr marL="171450" indent="-171450">
@@ -12516,37 +11619,7 @@
             </a:pPr>
             <a:r>
               <a:rPr lang="en-US" b="0" baseline="0" dirty="0" smtClean="0"/>
-              <a:t>no </a:t>
-            </a:r>
-            <a:r>
-              <a:rPr lang="en-US" b="0" baseline="0" dirty="0" smtClean="0"/>
-              <a:t>longer need to expose the shipping status as a </a:t>
-            </a:r>
-            <a:r>
-              <a:rPr lang="en-US" b="0" baseline="0" dirty="0" smtClean="0"/>
-              <a:t>parameter</a:t>
-            </a:r>
-          </a:p>
-          <a:p>
-            <a:pPr marL="171450" indent="-171450">
-              <a:buFont typeface="Arial" panose="020B0604020202020204" pitchFamily="34" charset="0"/>
-              <a:buChar char="•"/>
-            </a:pPr>
-            <a:r>
-              <a:rPr lang="en-US" b="0" baseline="0" dirty="0" smtClean="0"/>
-              <a:t>no </a:t>
-            </a:r>
-            <a:r>
-              <a:rPr lang="en-US" b="0" baseline="0" dirty="0" smtClean="0"/>
-              <a:t>longer need </a:t>
-            </a:r>
-            <a:r>
-              <a:rPr lang="en-US" b="0" baseline="0" dirty="0" smtClean="0"/>
-              <a:t>shipping </a:t>
-            </a:r>
-            <a:r>
-              <a:rPr lang="en-US" b="0" baseline="0" dirty="0" smtClean="0"/>
-              <a:t>method and ship date to default to null. </a:t>
+              <a:t>no longer need shipping method and ship date to default to null. </a:t>
             </a:r>
           </a:p>
           <a:p>
@@ -12578,31 +11651,7 @@
             </a:r>
             <a:r>
               <a:rPr lang="en-US" b="0" baseline="0" dirty="0" smtClean="0"/>
-              <a:t> </a:t>
-            </a:r>
-            <a:r>
-              <a:rPr lang="en-US" b="0" baseline="0" dirty="0" smtClean="0"/>
-              <a:t>Do sparingly </a:t>
-            </a:r>
-            <a:r>
-              <a:rPr lang="en-US" b="0" baseline="0" dirty="0" smtClean="0"/>
-              <a:t>because </a:t>
-            </a:r>
-            <a:r>
-              <a:rPr lang="en-US" b="0" baseline="0" dirty="0" smtClean="0"/>
-              <a:t>same </a:t>
-            </a:r>
-            <a:r>
-              <a:rPr lang="en-US" b="0" baseline="0" dirty="0" smtClean="0"/>
-              <a:t>drawbacks as </a:t>
-            </a:r>
-            <a:r>
-              <a:rPr lang="en-US" b="0" baseline="0" dirty="0" smtClean="0"/>
-              <a:t>Object Mother. I </a:t>
-            </a:r>
-            <a:r>
-              <a:rPr lang="en-US" b="0" baseline="0" dirty="0" smtClean="0"/>
-              <a:t>tend to have a small number of factory methods for very common and coarse grained specification, and then rely on parameters to specialize the data further.</a:t>
+              <a:t> Do sparingly because same drawbacks as Object Mother. I tend to have a small number of factory methods for very common and coarse grained specification, and then rely on parameters to specialize the data further.</a:t>
             </a:r>
             <a:endParaRPr lang="en-US" b="1" baseline="0" dirty="0" smtClean="0"/>
           </a:p>
@@ -12690,23 +11739,7 @@
           <a:p>
             <a:r>
               <a:rPr lang="en-US" baseline="0" dirty="0" smtClean="0"/>
-              <a:t>Another key point </a:t>
-            </a:r>
-            <a:r>
-              <a:rPr lang="en-US" baseline="0" dirty="0" smtClean="0"/>
-              <a:t>is </a:t>
-            </a:r>
-            <a:r>
-              <a:rPr lang="en-US" baseline="0" dirty="0" smtClean="0"/>
-              <a:t>that </a:t>
-            </a:r>
-            <a:r>
-              <a:rPr lang="en-US" baseline="0" dirty="0" smtClean="0"/>
-              <a:t>helpers </a:t>
-            </a:r>
-            <a:r>
-              <a:rPr lang="en-US" baseline="0" dirty="0" smtClean="0"/>
-              <a:t>should be declarative in nature. </a:t>
+              <a:t>Another key point is that helpers should be declarative in nature. </a:t>
             </a:r>
           </a:p>
           <a:p>
@@ -12723,11 +11756,7 @@
             </a:r>
             <a:r>
               <a:rPr lang="en-US" i="0" baseline="0" dirty="0" smtClean="0"/>
-              <a:t>is being created </a:t>
-            </a:r>
-            <a:r>
-              <a:rPr lang="en-US" i="0" baseline="0" dirty="0" smtClean="0"/>
-              <a:t>not </a:t>
+              <a:t>is being created not </a:t>
             </a:r>
             <a:r>
               <a:rPr lang="en-US" i="1" baseline="0" dirty="0" smtClean="0"/>
@@ -12742,7 +11771,6 @@
               <a:rPr lang="en-US" i="0" baseline="0" dirty="0" smtClean="0"/>
               <a:t>Let the helper deal with the ACTUAL domain model – keep tests clean and expressive</a:t>
             </a:r>
-            <a:endParaRPr lang="en-US" i="0" baseline="0" dirty="0" smtClean="0"/>
           </a:p>
           <a:p>
             <a:pPr marL="628650" lvl="1" indent="-171450">
@@ -12760,7 +11788,6 @@
               <a:rPr lang="en-US" baseline="0" dirty="0" smtClean="0"/>
               <a:t>Example: multiple payments</a:t>
             </a:r>
-            <a:endParaRPr lang="en-US" baseline="0" dirty="0" smtClean="0"/>
           </a:p>
           <a:p>
             <a:pPr marL="628650" lvl="1" indent="-171450">
@@ -12771,7 +11798,6 @@
               <a:rPr lang="en-US" baseline="0" dirty="0" smtClean="0"/>
               <a:t>Order has Payments collection – multiple statements to add multiple pays</a:t>
             </a:r>
-            <a:endParaRPr lang="en-US" baseline="0" dirty="0" smtClean="0"/>
           </a:p>
           <a:p>
             <a:pPr marL="628650" lvl="1" indent="-171450">
@@ -12799,7 +11825,6 @@
               <a:rPr lang="en-US" baseline="0" dirty="0" smtClean="0"/>
               <a:t>Resilient – domain model can change, tests may not</a:t>
             </a:r>
-            <a:endParaRPr lang="en-US" baseline="0" dirty="0" smtClean="0"/>
           </a:p>
         </p:txBody>
       </p:sp>
@@ -14815,32 +13840,18 @@
             </a:pPr>
             <a:r>
               <a:rPr lang="en-US" baseline="0" dirty="0" smtClean="0"/>
-              <a:t>Can’t just new up </a:t>
-            </a:r>
+              <a:t>Can’t just new up things and save them</a:t>
+            </a:r>
+          </a:p>
+          <a:p>
+            <a:pPr marL="628650" lvl="1" indent="-171450">
+              <a:buFont typeface="Arial" panose="020B0604020202020204" pitchFamily="34" charset="0"/>
+              <a:buChar char="•"/>
+            </a:pPr>
             <a:r>
               <a:rPr lang="en-US" baseline="0" dirty="0" smtClean="0"/>
-              <a:t>things and save them</a:t>
-            </a:r>
-            <a:endParaRPr lang="en-US" baseline="0" dirty="0" smtClean="0"/>
-          </a:p>
-          <a:p>
-            <a:pPr marL="628650" lvl="1" indent="-171450">
-              <a:buFont typeface="Arial" panose="020B0604020202020204" pitchFamily="34" charset="0"/>
-              <a:buChar char="•"/>
-            </a:pPr>
-            <a:r>
-              <a:rPr lang="en-US" baseline="0" dirty="0" smtClean="0"/>
-              <a:t>New </a:t>
-            </a:r>
-            <a:r>
-              <a:rPr lang="en-US" baseline="0" dirty="0" smtClean="0"/>
-              <a:t>up entire object </a:t>
-            </a:r>
-            <a:r>
-              <a:rPr lang="en-US" baseline="0" dirty="0" smtClean="0"/>
-              <a:t>graph – save in correct sequence – update all ids</a:t>
-            </a:r>
-            <a:endParaRPr lang="en-US" baseline="0" dirty="0" smtClean="0"/>
+              <a:t>New up entire object graph – save in correct sequence – update all ids</a:t>
+            </a:r>
           </a:p>
           <a:p>
             <a:endParaRPr lang="en-US" baseline="0" dirty="0" smtClean="0"/>
@@ -15821,52 +14832,24 @@
             </a:r>
             <a:r>
               <a:rPr lang="en-US" dirty="0" smtClean="0"/>
-              <a:t>Finally</a:t>
-            </a:r>
+              <a:t>Finally, prevent test data from lingering around when our test run is over</a:t>
+            </a:r>
+          </a:p>
+          <a:p>
+            <a:pPr marL="171450" indent="-171450">
+              <a:buFont typeface="Arial" panose="020B0604020202020204" pitchFamily="34" charset="0"/>
+              <a:buChar char="•"/>
+            </a:pPr>
+            <a:endParaRPr lang="en-US" dirty="0" smtClean="0"/>
+          </a:p>
+          <a:p>
+            <a:pPr marL="171450" indent="-171450">
+              <a:buFont typeface="Arial" panose="020B0604020202020204" pitchFamily="34" charset="0"/>
+              <a:buChar char="•"/>
+            </a:pPr>
             <a:r>
               <a:rPr lang="en-US" dirty="0" smtClean="0"/>
-              <a:t>, </a:t>
-            </a:r>
-            <a:r>
-              <a:rPr lang="en-US" dirty="0" smtClean="0"/>
-              <a:t>prevent test </a:t>
-            </a:r>
-            <a:r>
-              <a:rPr lang="en-US" dirty="0" smtClean="0"/>
-              <a:t>data from lingering around when our test run is over</a:t>
-            </a:r>
-          </a:p>
-          <a:p>
-            <a:pPr marL="171450" indent="-171450">
-              <a:buFont typeface="Arial" panose="020B0604020202020204" pitchFamily="34" charset="0"/>
-              <a:buChar char="•"/>
-            </a:pPr>
-            <a:endParaRPr lang="en-US" dirty="0" smtClean="0"/>
-          </a:p>
-          <a:p>
-            <a:pPr marL="171450" indent="-171450">
-              <a:buFont typeface="Arial" panose="020B0604020202020204" pitchFamily="34" charset="0"/>
-              <a:buChar char="•"/>
-            </a:pPr>
-            <a:r>
-              <a:rPr lang="en-US" dirty="0" smtClean="0"/>
-              <a:t>Could reset database </a:t>
-            </a:r>
-            <a:r>
-              <a:rPr lang="en-US" dirty="0" smtClean="0"/>
-              <a:t>to </a:t>
-            </a:r>
-            <a:r>
-              <a:rPr lang="en-US" dirty="0" smtClean="0"/>
-              <a:t>known </a:t>
-            </a:r>
-            <a:r>
-              <a:rPr lang="en-US" dirty="0" smtClean="0"/>
-              <a:t>state </a:t>
-            </a:r>
-            <a:r>
-              <a:rPr lang="en-US" dirty="0" smtClean="0"/>
-              <a:t>– blows away</a:t>
+              <a:t>Could reset database to known state – blows away</a:t>
             </a:r>
             <a:r>
               <a:rPr lang="en-US" baseline="0" dirty="0" smtClean="0"/>
@@ -17227,75 +16210,25 @@
             </a:pPr>
             <a:r>
               <a:rPr lang="en-US" baseline="0" dirty="0" smtClean="0"/>
-              <a:t>About an hour ago I made </a:t>
-            </a:r>
+              <a:t>About an hour ago I made assertion that your tests suck. Suck up TIME, ENERGY and MONEY and leave you FRUSTRATED. I promised to lead you OUT OF DARKNESS and into the land of milk, honey and unicorns…</a:t>
+            </a:r>
+          </a:p>
+          <a:p>
+            <a:pPr marL="0" indent="0">
+              <a:buFont typeface="Arial" panose="020B0604020202020204" pitchFamily="34" charset="0"/>
+              <a:buNone/>
+            </a:pPr>
+            <a:endParaRPr lang="en-US" baseline="0" dirty="0" smtClean="0"/>
+          </a:p>
+          <a:p>
+            <a:pPr marL="0" indent="0">
+              <a:buFont typeface="Arial" panose="020B0604020202020204" pitchFamily="34" charset="0"/>
+              <a:buNone/>
+            </a:pPr>
             <a:r>
               <a:rPr lang="en-US" baseline="0" dirty="0" smtClean="0"/>
-              <a:t>assertion </a:t>
-            </a:r>
-            <a:r>
-              <a:rPr lang="en-US" baseline="0" dirty="0" smtClean="0"/>
-              <a:t>that your tests suck. </a:t>
-            </a:r>
-            <a:r>
-              <a:rPr lang="en-US" baseline="0" dirty="0" smtClean="0"/>
-              <a:t>Suck up TIME, ENERGY and MONEY and leave </a:t>
-            </a:r>
-            <a:r>
-              <a:rPr lang="en-US" baseline="0" dirty="0" smtClean="0"/>
-              <a:t>you </a:t>
-            </a:r>
-            <a:r>
-              <a:rPr lang="en-US" baseline="0" dirty="0" smtClean="0"/>
-              <a:t>FRUSTRATED. </a:t>
-            </a:r>
-            <a:r>
-              <a:rPr lang="en-US" baseline="0" dirty="0" smtClean="0"/>
-              <a:t>I promised to lead you </a:t>
-            </a:r>
-            <a:r>
-              <a:rPr lang="en-US" baseline="0" dirty="0" smtClean="0"/>
-              <a:t>OUT OF DARKNESS and </a:t>
-            </a:r>
-            <a:r>
-              <a:rPr lang="en-US" baseline="0" dirty="0" smtClean="0"/>
-              <a:t>into the land of milk, honey and </a:t>
-            </a:r>
-            <a:r>
-              <a:rPr lang="en-US" baseline="0" dirty="0" smtClean="0"/>
-              <a:t>unicorns…</a:t>
-            </a:r>
-            <a:endParaRPr lang="en-US" baseline="0" dirty="0" smtClean="0"/>
-          </a:p>
-          <a:p>
-            <a:pPr marL="0" indent="0">
-              <a:buFont typeface="Arial" panose="020B0604020202020204" pitchFamily="34" charset="0"/>
-              <a:buNone/>
-            </a:pPr>
-            <a:endParaRPr lang="en-US" baseline="0" dirty="0" smtClean="0"/>
-          </a:p>
-          <a:p>
-            <a:pPr marL="0" indent="0">
-              <a:buFont typeface="Arial" panose="020B0604020202020204" pitchFamily="34" charset="0"/>
-              <a:buNone/>
-            </a:pPr>
-            <a:r>
-              <a:rPr lang="en-US" baseline="0" dirty="0" smtClean="0"/>
-              <a:t>New </a:t>
-            </a:r>
-            <a:r>
-              <a:rPr lang="en-US" baseline="0" dirty="0" smtClean="0"/>
-              <a:t>assertion is </a:t>
-            </a:r>
-            <a:r>
-              <a:rPr lang="en-US" baseline="0" dirty="0" smtClean="0"/>
-              <a:t>your </a:t>
-            </a:r>
-            <a:r>
-              <a:rPr lang="en-US" baseline="0" dirty="0" smtClean="0"/>
-              <a:t>tests aren’t going to suck any longer. </a:t>
-            </a:r>
-            <a:endParaRPr lang="en-US" baseline="0" dirty="0" smtClean="0"/>
+              <a:t>New assertion is your tests aren’t going to suck any longer. </a:t>
+            </a:r>
           </a:p>
           <a:p>
             <a:pPr marL="171450" indent="-171450">
@@ -17334,19 +16267,7 @@
             </a:pPr>
             <a:r>
               <a:rPr lang="en-US" baseline="0" dirty="0" smtClean="0"/>
-              <a:t>Given everything to </a:t>
-            </a:r>
-            <a:r>
-              <a:rPr lang="en-US" baseline="0" dirty="0" smtClean="0"/>
-              <a:t>keep </a:t>
-            </a:r>
-            <a:r>
-              <a:rPr lang="en-US" baseline="0" dirty="0" smtClean="0"/>
-              <a:t>assertion </a:t>
-            </a:r>
-            <a:r>
-              <a:rPr lang="en-US" baseline="0" dirty="0" smtClean="0"/>
-              <a:t>green.</a:t>
+              <a:t>Given everything to keep assertion green.</a:t>
             </a:r>
           </a:p>
           <a:p>
@@ -17654,7 +16575,7 @@
           <a:p>
             <a:fld id="{75AA6396-395E-4ADA-8EE5-F328BC863A04}" type="datetimeFigureOut">
               <a:rPr lang="en-US" smtClean="0"/>
-              <a:t>4/29/2015</a:t>
+              <a:t>11/12/2016</a:t>
             </a:fld>
             <a:endParaRPr lang="en-US"/>
           </a:p>
@@ -17831,7 +16752,7 @@
           <a:p>
             <a:fld id="{75AA6396-395E-4ADA-8EE5-F328BC863A04}" type="datetimeFigureOut">
               <a:rPr lang="en-US" smtClean="0"/>
-              <a:t>4/29/2015</a:t>
+              <a:t>11/12/2016</a:t>
             </a:fld>
             <a:endParaRPr lang="en-US"/>
           </a:p>
@@ -18011,7 +16932,7 @@
           <a:p>
             <a:fld id="{75AA6396-395E-4ADA-8EE5-F328BC863A04}" type="datetimeFigureOut">
               <a:rPr lang="en-US" smtClean="0"/>
-              <a:t>4/29/2015</a:t>
+              <a:t>11/12/2016</a:t>
             </a:fld>
             <a:endParaRPr lang="en-US"/>
           </a:p>
@@ -18231,7 +17152,7 @@
           <a:p>
             <a:fld id="{75AA6396-395E-4ADA-8EE5-F328BC863A04}" type="datetimeFigureOut">
               <a:rPr lang="en-US" smtClean="0"/>
-              <a:t>4/29/2015</a:t>
+              <a:t>11/12/2016</a:t>
             </a:fld>
             <a:endParaRPr lang="en-US"/>
           </a:p>
@@ -18484,7 +17405,7 @@
           <a:p>
             <a:fld id="{75AA6396-395E-4ADA-8EE5-F328BC863A04}" type="datetimeFigureOut">
               <a:rPr lang="en-US" smtClean="0"/>
-              <a:t>4/29/2015</a:t>
+              <a:t>11/12/2016</a:t>
             </a:fld>
             <a:endParaRPr lang="en-US"/>
           </a:p>
@@ -18723,7 +17644,7 @@
           <a:p>
             <a:fld id="{75AA6396-395E-4ADA-8EE5-F328BC863A04}" type="datetimeFigureOut">
               <a:rPr lang="en-US" smtClean="0"/>
-              <a:t>4/29/2015</a:t>
+              <a:t>11/12/2016</a:t>
             </a:fld>
             <a:endParaRPr lang="en-US"/>
           </a:p>
@@ -19097,7 +18018,7 @@
           <a:p>
             <a:fld id="{75AA6396-395E-4ADA-8EE5-F328BC863A04}" type="datetimeFigureOut">
               <a:rPr lang="en-US" smtClean="0"/>
-              <a:t>4/29/2015</a:t>
+              <a:t>11/12/2016</a:t>
             </a:fld>
             <a:endParaRPr lang="en-US"/>
           </a:p>
@@ -19215,7 +18136,7 @@
           <a:p>
             <a:fld id="{75AA6396-395E-4ADA-8EE5-F328BC863A04}" type="datetimeFigureOut">
               <a:rPr lang="en-US" smtClean="0"/>
-              <a:t>4/29/2015</a:t>
+              <a:t>11/12/2016</a:t>
             </a:fld>
             <a:endParaRPr lang="en-US"/>
           </a:p>
@@ -19310,7 +18231,7 @@
           <a:p>
             <a:fld id="{75AA6396-395E-4ADA-8EE5-F328BC863A04}" type="datetimeFigureOut">
               <a:rPr lang="en-US" smtClean="0"/>
-              <a:t>4/29/2015</a:t>
+              <a:t>11/12/2016</a:t>
             </a:fld>
             <a:endParaRPr lang="en-US"/>
           </a:p>
@@ -19587,7 +18508,7 @@
           <a:p>
             <a:fld id="{75AA6396-395E-4ADA-8EE5-F328BC863A04}" type="datetimeFigureOut">
               <a:rPr lang="en-US" smtClean="0"/>
-              <a:t>4/29/2015</a:t>
+              <a:t>11/12/2016</a:t>
             </a:fld>
             <a:endParaRPr lang="en-US"/>
           </a:p>
@@ -19840,7 +18761,7 @@
           <a:p>
             <a:fld id="{75AA6396-395E-4ADA-8EE5-F328BC863A04}" type="datetimeFigureOut">
               <a:rPr lang="en-US" smtClean="0"/>
-              <a:t>4/29/2015</a:t>
+              <a:t>11/12/2016</a:t>
             </a:fld>
             <a:endParaRPr lang="en-US"/>
           </a:p>
@@ -20053,7 +18974,7 @@
           <a:p>
             <a:fld id="{75AA6396-395E-4ADA-8EE5-F328BC863A04}" type="datetimeFigureOut">
               <a:rPr lang="en-US" smtClean="0"/>
-              <a:t>4/29/2015</a:t>
+              <a:t>11/12/2016</a:t>
             </a:fld>
             <a:endParaRPr lang="en-US"/>
           </a:p>

</xml_diff>